<commit_message>
Presentation and another font
MINOR
</commit_message>
<xml_diff>
--- a/ПРЕЗЕНТАЦИЯ.pptx
+++ b/ПРЕЗЕНТАЦИЯ.pptx
@@ -7,6 +7,15 @@
   <p:sldIdLst>
     <p:sldId id="256" r:id="rId2"/>
     <p:sldId id="257" r:id="rId3"/>
+    <p:sldId id="258" r:id="rId4"/>
+    <p:sldId id="267" r:id="rId5"/>
+    <p:sldId id="266" r:id="rId6"/>
+    <p:sldId id="259" r:id="rId7"/>
+    <p:sldId id="260" r:id="rId8"/>
+    <p:sldId id="261" r:id="rId9"/>
+    <p:sldId id="262" r:id="rId10"/>
+    <p:sldId id="263" r:id="rId11"/>
+    <p:sldId id="264" r:id="rId12"/>
   </p:sldIdLst>
   <p:sldSz cx="12192000" cy="6858000"/>
   <p:notesSz cx="6858000" cy="9144000"/>
@@ -105,6 +114,11 @@
       </a:defRPr>
     </a:lvl9pPr>
   </p:defaultTextStyle>
+  <p:extLst>
+    <p:ext uri="{EFAFB233-063F-42B5-8137-9DF3F51BA10A}">
+      <p15:sldGuideLst xmlns:p15="http://schemas.microsoft.com/office/powerpoint/2012/main"/>
+    </p:ext>
+  </p:extLst>
 </p:presentation>
 </file>
 
@@ -239,9 +253,9 @@
           <a:p>
             <a:fld id="{81BF0E68-2E2D-44C4-8506-D44420188D8D}" type="datetimeFigureOut">
               <a:rPr lang="ru-RU" smtClean="0"/>
-              <a:t>12.01.2023</a:t>
+              <a:t>17.01.2023</a:t>
             </a:fld>
-            <a:endParaRPr lang="ru-RU"/>
+            <a:endParaRPr lang="ru-RU" dirty="0"/>
           </a:p>
         </p:txBody>
       </p:sp>
@@ -260,7 +274,7 @@
           <a:bodyPr/>
           <a:lstStyle/>
           <a:p>
-            <a:endParaRPr lang="ru-RU"/>
+            <a:endParaRPr lang="ru-RU" dirty="0"/>
           </a:p>
         </p:txBody>
       </p:sp>
@@ -283,7 +297,7 @@
               <a:rPr lang="ru-RU" smtClean="0"/>
               <a:t>‹#›</a:t>
             </a:fld>
-            <a:endParaRPr lang="ru-RU"/>
+            <a:endParaRPr lang="ru-RU" dirty="0"/>
           </a:p>
         </p:txBody>
       </p:sp>
@@ -297,6 +311,9 @@
   <p:clrMapOvr>
     <a:masterClrMapping/>
   </p:clrMapOvr>
+  <p:transition spd="slow">
+    <p:randomBar/>
+  </p:transition>
 </p:sldLayout>
 </file>
 
@@ -409,9 +426,9 @@
           <a:p>
             <a:fld id="{81BF0E68-2E2D-44C4-8506-D44420188D8D}" type="datetimeFigureOut">
               <a:rPr lang="ru-RU" smtClean="0"/>
-              <a:t>12.01.2023</a:t>
+              <a:t>17.01.2023</a:t>
             </a:fld>
-            <a:endParaRPr lang="ru-RU"/>
+            <a:endParaRPr lang="ru-RU" dirty="0"/>
           </a:p>
         </p:txBody>
       </p:sp>
@@ -430,7 +447,7 @@
           <a:bodyPr/>
           <a:lstStyle/>
           <a:p>
-            <a:endParaRPr lang="ru-RU"/>
+            <a:endParaRPr lang="ru-RU" dirty="0"/>
           </a:p>
         </p:txBody>
       </p:sp>
@@ -453,7 +470,7 @@
               <a:rPr lang="ru-RU" smtClean="0"/>
               <a:t>‹#›</a:t>
             </a:fld>
-            <a:endParaRPr lang="ru-RU"/>
+            <a:endParaRPr lang="ru-RU" dirty="0"/>
           </a:p>
         </p:txBody>
       </p:sp>
@@ -467,6 +484,9 @@
   <p:clrMapOvr>
     <a:masterClrMapping/>
   </p:clrMapOvr>
+  <p:transition spd="slow">
+    <p:randomBar/>
+  </p:transition>
 </p:sldLayout>
 </file>
 
@@ -589,9 +609,9 @@
           <a:p>
             <a:fld id="{81BF0E68-2E2D-44C4-8506-D44420188D8D}" type="datetimeFigureOut">
               <a:rPr lang="ru-RU" smtClean="0"/>
-              <a:t>12.01.2023</a:t>
+              <a:t>17.01.2023</a:t>
             </a:fld>
-            <a:endParaRPr lang="ru-RU"/>
+            <a:endParaRPr lang="ru-RU" dirty="0"/>
           </a:p>
         </p:txBody>
       </p:sp>
@@ -610,7 +630,7 @@
           <a:bodyPr/>
           <a:lstStyle/>
           <a:p>
-            <a:endParaRPr lang="ru-RU"/>
+            <a:endParaRPr lang="ru-RU" dirty="0"/>
           </a:p>
         </p:txBody>
       </p:sp>
@@ -633,7 +653,7 @@
               <a:rPr lang="ru-RU" smtClean="0"/>
               <a:t>‹#›</a:t>
             </a:fld>
-            <a:endParaRPr lang="ru-RU"/>
+            <a:endParaRPr lang="ru-RU" dirty="0"/>
           </a:p>
         </p:txBody>
       </p:sp>
@@ -647,6 +667,9 @@
   <p:clrMapOvr>
     <a:masterClrMapping/>
   </p:clrMapOvr>
+  <p:transition spd="slow">
+    <p:randomBar/>
+  </p:transition>
 </p:sldLayout>
 </file>
 
@@ -759,9 +782,9 @@
           <a:p>
             <a:fld id="{81BF0E68-2E2D-44C4-8506-D44420188D8D}" type="datetimeFigureOut">
               <a:rPr lang="ru-RU" smtClean="0"/>
-              <a:t>12.01.2023</a:t>
+              <a:t>17.01.2023</a:t>
             </a:fld>
-            <a:endParaRPr lang="ru-RU"/>
+            <a:endParaRPr lang="ru-RU" dirty="0"/>
           </a:p>
         </p:txBody>
       </p:sp>
@@ -780,7 +803,7 @@
           <a:bodyPr/>
           <a:lstStyle/>
           <a:p>
-            <a:endParaRPr lang="ru-RU"/>
+            <a:endParaRPr lang="ru-RU" dirty="0"/>
           </a:p>
         </p:txBody>
       </p:sp>
@@ -803,7 +826,7 @@
               <a:rPr lang="ru-RU" smtClean="0"/>
               <a:t>‹#›</a:t>
             </a:fld>
-            <a:endParaRPr lang="ru-RU"/>
+            <a:endParaRPr lang="ru-RU" dirty="0"/>
           </a:p>
         </p:txBody>
       </p:sp>
@@ -817,6 +840,9 @@
   <p:clrMapOvr>
     <a:masterClrMapping/>
   </p:clrMapOvr>
+  <p:transition spd="slow">
+    <p:randomBar/>
+  </p:transition>
 </p:sldLayout>
 </file>
 
@@ -1005,9 +1031,9 @@
           <a:p>
             <a:fld id="{81BF0E68-2E2D-44C4-8506-D44420188D8D}" type="datetimeFigureOut">
               <a:rPr lang="ru-RU" smtClean="0"/>
-              <a:t>12.01.2023</a:t>
+              <a:t>17.01.2023</a:t>
             </a:fld>
-            <a:endParaRPr lang="ru-RU"/>
+            <a:endParaRPr lang="ru-RU" dirty="0"/>
           </a:p>
         </p:txBody>
       </p:sp>
@@ -1026,7 +1052,7 @@
           <a:bodyPr/>
           <a:lstStyle/>
           <a:p>
-            <a:endParaRPr lang="ru-RU"/>
+            <a:endParaRPr lang="ru-RU" dirty="0"/>
           </a:p>
         </p:txBody>
       </p:sp>
@@ -1049,7 +1075,7 @@
               <a:rPr lang="ru-RU" smtClean="0"/>
               <a:t>‹#›</a:t>
             </a:fld>
-            <a:endParaRPr lang="ru-RU"/>
+            <a:endParaRPr lang="ru-RU" dirty="0"/>
           </a:p>
         </p:txBody>
       </p:sp>
@@ -1063,6 +1089,9 @@
   <p:clrMapOvr>
     <a:masterClrMapping/>
   </p:clrMapOvr>
+  <p:transition spd="slow">
+    <p:randomBar/>
+  </p:transition>
 </p:sldLayout>
 </file>
 
@@ -1237,9 +1266,9 @@
           <a:p>
             <a:fld id="{81BF0E68-2E2D-44C4-8506-D44420188D8D}" type="datetimeFigureOut">
               <a:rPr lang="ru-RU" smtClean="0"/>
-              <a:t>12.01.2023</a:t>
+              <a:t>17.01.2023</a:t>
             </a:fld>
-            <a:endParaRPr lang="ru-RU"/>
+            <a:endParaRPr lang="ru-RU" dirty="0"/>
           </a:p>
         </p:txBody>
       </p:sp>
@@ -1258,7 +1287,7 @@
           <a:bodyPr/>
           <a:lstStyle/>
           <a:p>
-            <a:endParaRPr lang="ru-RU"/>
+            <a:endParaRPr lang="ru-RU" dirty="0"/>
           </a:p>
         </p:txBody>
       </p:sp>
@@ -1281,7 +1310,7 @@
               <a:rPr lang="ru-RU" smtClean="0"/>
               <a:t>‹#›</a:t>
             </a:fld>
-            <a:endParaRPr lang="ru-RU"/>
+            <a:endParaRPr lang="ru-RU" dirty="0"/>
           </a:p>
         </p:txBody>
       </p:sp>
@@ -1295,6 +1324,9 @@
   <p:clrMapOvr>
     <a:masterClrMapping/>
   </p:clrMapOvr>
+  <p:transition spd="slow">
+    <p:randomBar/>
+  </p:transition>
 </p:sldLayout>
 </file>
 
@@ -1604,9 +1636,9 @@
           <a:p>
             <a:fld id="{81BF0E68-2E2D-44C4-8506-D44420188D8D}" type="datetimeFigureOut">
               <a:rPr lang="ru-RU" smtClean="0"/>
-              <a:t>12.01.2023</a:t>
+              <a:t>17.01.2023</a:t>
             </a:fld>
-            <a:endParaRPr lang="ru-RU"/>
+            <a:endParaRPr lang="ru-RU" dirty="0"/>
           </a:p>
         </p:txBody>
       </p:sp>
@@ -1625,7 +1657,7 @@
           <a:bodyPr/>
           <a:lstStyle/>
           <a:p>
-            <a:endParaRPr lang="ru-RU"/>
+            <a:endParaRPr lang="ru-RU" dirty="0"/>
           </a:p>
         </p:txBody>
       </p:sp>
@@ -1648,7 +1680,7 @@
               <a:rPr lang="ru-RU" smtClean="0"/>
               <a:t>‹#›</a:t>
             </a:fld>
-            <a:endParaRPr lang="ru-RU"/>
+            <a:endParaRPr lang="ru-RU" dirty="0"/>
           </a:p>
         </p:txBody>
       </p:sp>
@@ -1662,6 +1694,9 @@
   <p:clrMapOvr>
     <a:masterClrMapping/>
   </p:clrMapOvr>
+  <p:transition spd="slow">
+    <p:randomBar/>
+  </p:transition>
 </p:sldLayout>
 </file>
 
@@ -1722,9 +1757,9 @@
           <a:p>
             <a:fld id="{81BF0E68-2E2D-44C4-8506-D44420188D8D}" type="datetimeFigureOut">
               <a:rPr lang="ru-RU" smtClean="0"/>
-              <a:t>12.01.2023</a:t>
+              <a:t>17.01.2023</a:t>
             </a:fld>
-            <a:endParaRPr lang="ru-RU"/>
+            <a:endParaRPr lang="ru-RU" dirty="0"/>
           </a:p>
         </p:txBody>
       </p:sp>
@@ -1743,7 +1778,7 @@
           <a:bodyPr/>
           <a:lstStyle/>
           <a:p>
-            <a:endParaRPr lang="ru-RU"/>
+            <a:endParaRPr lang="ru-RU" dirty="0"/>
           </a:p>
         </p:txBody>
       </p:sp>
@@ -1766,7 +1801,7 @@
               <a:rPr lang="ru-RU" smtClean="0"/>
               <a:t>‹#›</a:t>
             </a:fld>
-            <a:endParaRPr lang="ru-RU"/>
+            <a:endParaRPr lang="ru-RU" dirty="0"/>
           </a:p>
         </p:txBody>
       </p:sp>
@@ -1780,6 +1815,9 @@
   <p:clrMapOvr>
     <a:masterClrMapping/>
   </p:clrMapOvr>
+  <p:transition spd="slow">
+    <p:randomBar/>
+  </p:transition>
 </p:sldLayout>
 </file>
 
@@ -1817,9 +1855,9 @@
           <a:p>
             <a:fld id="{81BF0E68-2E2D-44C4-8506-D44420188D8D}" type="datetimeFigureOut">
               <a:rPr lang="ru-RU" smtClean="0"/>
-              <a:t>12.01.2023</a:t>
+              <a:t>17.01.2023</a:t>
             </a:fld>
-            <a:endParaRPr lang="ru-RU"/>
+            <a:endParaRPr lang="ru-RU" dirty="0"/>
           </a:p>
         </p:txBody>
       </p:sp>
@@ -1838,7 +1876,7 @@
           <a:bodyPr/>
           <a:lstStyle/>
           <a:p>
-            <a:endParaRPr lang="ru-RU"/>
+            <a:endParaRPr lang="ru-RU" dirty="0"/>
           </a:p>
         </p:txBody>
       </p:sp>
@@ -1861,7 +1899,7 @@
               <a:rPr lang="ru-RU" smtClean="0"/>
               <a:t>‹#›</a:t>
             </a:fld>
-            <a:endParaRPr lang="ru-RU"/>
+            <a:endParaRPr lang="ru-RU" dirty="0"/>
           </a:p>
         </p:txBody>
       </p:sp>
@@ -1875,6 +1913,9 @@
   <p:clrMapOvr>
     <a:masterClrMapping/>
   </p:clrMapOvr>
+  <p:transition spd="slow">
+    <p:randomBar/>
+  </p:transition>
 </p:sldLayout>
 </file>
 
@@ -2094,9 +2135,9 @@
           <a:p>
             <a:fld id="{81BF0E68-2E2D-44C4-8506-D44420188D8D}" type="datetimeFigureOut">
               <a:rPr lang="ru-RU" smtClean="0"/>
-              <a:t>12.01.2023</a:t>
+              <a:t>17.01.2023</a:t>
             </a:fld>
-            <a:endParaRPr lang="ru-RU"/>
+            <a:endParaRPr lang="ru-RU" dirty="0"/>
           </a:p>
         </p:txBody>
       </p:sp>
@@ -2115,7 +2156,7 @@
           <a:bodyPr/>
           <a:lstStyle/>
           <a:p>
-            <a:endParaRPr lang="ru-RU"/>
+            <a:endParaRPr lang="ru-RU" dirty="0"/>
           </a:p>
         </p:txBody>
       </p:sp>
@@ -2138,7 +2179,7 @@
               <a:rPr lang="ru-RU" smtClean="0"/>
               <a:t>‹#›</a:t>
             </a:fld>
-            <a:endParaRPr lang="ru-RU"/>
+            <a:endParaRPr lang="ru-RU" dirty="0"/>
           </a:p>
         </p:txBody>
       </p:sp>
@@ -2152,6 +2193,9 @@
   <p:clrMapOvr>
     <a:masterClrMapping/>
   </p:clrMapOvr>
+  <p:transition spd="slow">
+    <p:randomBar/>
+  </p:transition>
 </p:sldLayout>
 </file>
 
@@ -2261,7 +2305,7 @@
             </a:lvl9pPr>
           </a:lstStyle>
           <a:p>
-            <a:endParaRPr lang="ru-RU"/>
+            <a:endParaRPr lang="ru-RU" dirty="0"/>
           </a:p>
         </p:txBody>
       </p:sp>
@@ -2347,9 +2391,9 @@
           <a:p>
             <a:fld id="{81BF0E68-2E2D-44C4-8506-D44420188D8D}" type="datetimeFigureOut">
               <a:rPr lang="ru-RU" smtClean="0"/>
-              <a:t>12.01.2023</a:t>
+              <a:t>17.01.2023</a:t>
             </a:fld>
-            <a:endParaRPr lang="ru-RU"/>
+            <a:endParaRPr lang="ru-RU" dirty="0"/>
           </a:p>
         </p:txBody>
       </p:sp>
@@ -2368,7 +2412,7 @@
           <a:bodyPr/>
           <a:lstStyle/>
           <a:p>
-            <a:endParaRPr lang="ru-RU"/>
+            <a:endParaRPr lang="ru-RU" dirty="0"/>
           </a:p>
         </p:txBody>
       </p:sp>
@@ -2391,7 +2435,7 @@
               <a:rPr lang="ru-RU" smtClean="0"/>
               <a:t>‹#›</a:t>
             </a:fld>
-            <a:endParaRPr lang="ru-RU"/>
+            <a:endParaRPr lang="ru-RU" dirty="0"/>
           </a:p>
         </p:txBody>
       </p:sp>
@@ -2405,6 +2449,9 @@
   <p:clrMapOvr>
     <a:masterClrMapping/>
   </p:clrMapOvr>
+  <p:transition spd="slow">
+    <p:randomBar/>
+  </p:transition>
 </p:sldLayout>
 </file>
 
@@ -2412,9 +2459,28 @@
 <p:sldMaster xmlns:a="http://schemas.openxmlformats.org/drawingml/2006/main" xmlns:r="http://schemas.openxmlformats.org/officeDocument/2006/relationships" xmlns:p="http://schemas.openxmlformats.org/presentationml/2006/main">
   <p:cSld>
     <p:bg>
-      <p:bgRef idx="1001">
-        <a:schemeClr val="bg1"/>
-      </p:bgRef>
+      <p:bgPr>
+        <a:blipFill dpi="0" rotWithShape="1">
+          <a:blip r:embed="rId13">
+            <a:extLst>
+              <a:ext uri="{BEBA8EAE-BF5A-486C-A8C5-ECC9F3942E4B}">
+                <a14:imgProps xmlns:a14="http://schemas.microsoft.com/office/drawing/2010/main">
+                  <a14:imgLayer r:embed="rId14">
+                    <a14:imgEffect>
+                      <a14:brightnessContrast bright="-59000"/>
+                    </a14:imgEffect>
+                  </a14:imgLayer>
+                </a14:imgProps>
+              </a:ext>
+            </a:extLst>
+          </a:blip>
+          <a:srcRect/>
+          <a:stretch>
+            <a:fillRect t="-21000" b="-21000"/>
+          </a:stretch>
+        </a:blipFill>
+        <a:effectLst/>
+      </p:bgPr>
     </p:bg>
     <p:spTree>
       <p:nvGrpSpPr>
@@ -2560,9 +2626,9 @@
           <a:p>
             <a:fld id="{81BF0E68-2E2D-44C4-8506-D44420188D8D}" type="datetimeFigureOut">
               <a:rPr lang="ru-RU" smtClean="0"/>
-              <a:t>12.01.2023</a:t>
+              <a:t>17.01.2023</a:t>
             </a:fld>
-            <a:endParaRPr lang="ru-RU"/>
+            <a:endParaRPr lang="ru-RU" dirty="0"/>
           </a:p>
         </p:txBody>
       </p:sp>
@@ -2599,7 +2665,7 @@
             </a:lvl1pPr>
           </a:lstStyle>
           <a:p>
-            <a:endParaRPr lang="ru-RU"/>
+            <a:endParaRPr lang="ru-RU" dirty="0"/>
           </a:p>
         </p:txBody>
       </p:sp>
@@ -2640,7 +2706,7 @@
               <a:rPr lang="ru-RU" smtClean="0"/>
               <a:t>‹#›</a:t>
             </a:fld>
-            <a:endParaRPr lang="ru-RU"/>
+            <a:endParaRPr lang="ru-RU" dirty="0"/>
           </a:p>
         </p:txBody>
       </p:sp>
@@ -2665,6 +2731,9 @@
     <p:sldLayoutId id="2147483658" r:id="rId10"/>
     <p:sldLayoutId id="2147483659" r:id="rId11"/>
   </p:sldLayoutIdLst>
+  <p:transition spd="slow">
+    <p:randomBar/>
+  </p:transition>
   <p:txStyles>
     <p:titleStyle>
       <a:lvl1pPr algn="l" defTabSz="914400" rtl="0" eaLnBrk="1" latinLnBrk="0" hangingPunct="1">
@@ -2951,20 +3020,6 @@
 <file path=ppt/slides/slide1.xml><?xml version="1.0" encoding="utf-8"?>
 <p:sld xmlns:a="http://schemas.openxmlformats.org/drawingml/2006/main" xmlns:r="http://schemas.openxmlformats.org/officeDocument/2006/relationships" xmlns:p="http://schemas.openxmlformats.org/presentationml/2006/main">
   <p:cSld>
-    <p:bg>
-      <p:bgPr>
-        <a:blipFill dpi="0" rotWithShape="1">
-          <a:blip r:embed="rId2">
-            <a:lum/>
-          </a:blip>
-          <a:srcRect/>
-          <a:stretch>
-            <a:fillRect t="-21000" b="-21000"/>
-          </a:stretch>
-        </a:blipFill>
-        <a:effectLst/>
-      </p:bgPr>
-    </p:bg>
     <p:spTree>
       <p:nvGrpSpPr>
         <p:cNvPr id="1" name=""/>
@@ -3087,6 +3142,8 @@
                 <a:solidFill>
                   <a:srgbClr val="00FFFF"/>
                 </a:solidFill>
+                <a:latin typeface="Courier New" panose="02070309020205020404" pitchFamily="49" charset="0"/>
+                <a:cs typeface="Courier New" panose="02070309020205020404" pitchFamily="49" charset="0"/>
               </a:rPr>
               <a:t>Проект выполнил Симонов М.В.</a:t>
             </a:r>
@@ -3094,6 +3151,8 @@
               <a:solidFill>
                 <a:srgbClr val="00FFFF"/>
               </a:solidFill>
+              <a:latin typeface="Courier New" panose="02070309020205020404" pitchFamily="49" charset="0"/>
+              <a:cs typeface="Courier New" panose="02070309020205020404" pitchFamily="49" charset="0"/>
             </a:endParaRPr>
           </a:p>
         </p:txBody>
@@ -3108,6 +3167,306 @@
   <p:clrMapOvr>
     <a:masterClrMapping/>
   </p:clrMapOvr>
+  <p:transition spd="slow">
+    <p:randomBar/>
+  </p:transition>
+  <p:timing>
+    <p:tnLst>
+      <p:par>
+        <p:cTn id="1" dur="indefinite" restart="never" nodeType="tmRoot"/>
+      </p:par>
+    </p:tnLst>
+  </p:timing>
+</p:sld>
+</file>
+
+<file path=ppt/slides/slide10.xml><?xml version="1.0" encoding="utf-8"?>
+<p:sld xmlns:a="http://schemas.openxmlformats.org/drawingml/2006/main" xmlns:r="http://schemas.openxmlformats.org/officeDocument/2006/relationships" xmlns:p="http://schemas.openxmlformats.org/presentationml/2006/main">
+  <p:cSld>
+    <p:spTree>
+      <p:nvGrpSpPr>
+        <p:cNvPr id="1" name=""/>
+        <p:cNvGrpSpPr/>
+        <p:nvPr/>
+      </p:nvGrpSpPr>
+      <p:grpSpPr>
+        <a:xfrm>
+          <a:off x="0" y="0"/>
+          <a:ext cx="0" cy="0"/>
+          <a:chOff x="0" y="0"/>
+          <a:chExt cx="0" cy="0"/>
+        </a:xfrm>
+      </p:grpSpPr>
+      <p:sp>
+        <p:nvSpPr>
+          <p:cNvPr id="8" name="Заголовок 7"/>
+          <p:cNvSpPr>
+            <a:spLocks noGrp="1"/>
+          </p:cNvSpPr>
+          <p:nvPr>
+            <p:ph type="title"/>
+          </p:nvPr>
+        </p:nvSpPr>
+        <p:spPr/>
+        <p:txBody>
+          <a:bodyPr/>
+          <a:lstStyle/>
+          <a:p>
+            <a:pPr algn="ctr"/>
+            <a:r>
+              <a:rPr lang="ru-RU" dirty="0" smtClean="0">
+                <a:solidFill>
+                  <a:srgbClr val="00FFFF"/>
+                </a:solidFill>
+                <a:latin typeface="Courier New" panose="02070309020205020404" pitchFamily="49" charset="0"/>
+                <a:cs typeface="Courier New" panose="02070309020205020404" pitchFamily="49" charset="0"/>
+              </a:rPr>
+              <a:t>Заключение.</a:t>
+            </a:r>
+            <a:endParaRPr lang="ru-RU" dirty="0">
+              <a:solidFill>
+                <a:srgbClr val="00FFFF"/>
+              </a:solidFill>
+              <a:latin typeface="Courier New" panose="02070309020205020404" pitchFamily="49" charset="0"/>
+              <a:cs typeface="Courier New" panose="02070309020205020404" pitchFamily="49" charset="0"/>
+            </a:endParaRPr>
+          </a:p>
+        </p:txBody>
+      </p:sp>
+      <p:sp>
+        <p:nvSpPr>
+          <p:cNvPr id="9" name="Объект 8"/>
+          <p:cNvSpPr>
+            <a:spLocks noGrp="1"/>
+          </p:cNvSpPr>
+          <p:nvPr>
+            <p:ph idx="1"/>
+          </p:nvPr>
+        </p:nvSpPr>
+        <p:spPr/>
+        <p:txBody>
+          <a:bodyPr/>
+          <a:lstStyle/>
+          <a:p>
+            <a:pPr marL="0" indent="0">
+              <a:buNone/>
+            </a:pPr>
+            <a:r>
+              <a:rPr lang="ru-RU" dirty="0" smtClean="0">
+                <a:solidFill>
+                  <a:srgbClr val="00FFFF"/>
+                </a:solidFill>
+                <a:latin typeface="Courier New" panose="02070309020205020404" pitchFamily="49" charset="0"/>
+                <a:cs typeface="Courier New" panose="02070309020205020404" pitchFamily="49" charset="0"/>
+              </a:rPr>
+              <a:t>Обобщая сказанное, я могу сделать следующие выводы:</a:t>
+            </a:r>
+          </a:p>
+          <a:p>
+            <a:r>
+              <a:rPr lang="ru-RU" dirty="0" smtClean="0">
+                <a:solidFill>
+                  <a:srgbClr val="00FFFF"/>
+                </a:solidFill>
+                <a:latin typeface="Courier New" panose="02070309020205020404" pitchFamily="49" charset="0"/>
+                <a:cs typeface="Courier New" panose="02070309020205020404" pitchFamily="49" charset="0"/>
+              </a:rPr>
+              <a:t>В ходе работы я научился работать с библиотекой </a:t>
+            </a:r>
+            <a:r>
+              <a:rPr lang="en-US" dirty="0" smtClean="0">
+                <a:solidFill>
+                  <a:srgbClr val="00FFFF"/>
+                </a:solidFill>
+                <a:latin typeface="Orbitron" panose="02000000000000000000" pitchFamily="2" charset="0"/>
+                <a:cs typeface="Courier New" panose="02070309020205020404" pitchFamily="49" charset="0"/>
+              </a:rPr>
+              <a:t>pygame</a:t>
+            </a:r>
+            <a:r>
+              <a:rPr lang="en-US" dirty="0" smtClean="0">
+                <a:solidFill>
+                  <a:srgbClr val="00FFFF"/>
+                </a:solidFill>
+                <a:latin typeface="Courier New" panose="02070309020205020404" pitchFamily="49" charset="0"/>
+                <a:cs typeface="Courier New" panose="02070309020205020404" pitchFamily="49" charset="0"/>
+              </a:rPr>
+              <a:t>;</a:t>
+            </a:r>
+            <a:endParaRPr lang="en-US" dirty="0" smtClean="0">
+              <a:solidFill>
+                <a:srgbClr val="00FFFF"/>
+              </a:solidFill>
+              <a:latin typeface="Orbitron" panose="02000000000000000000" pitchFamily="2" charset="0"/>
+              <a:cs typeface="Courier New" panose="02070309020205020404" pitchFamily="49" charset="0"/>
+            </a:endParaRPr>
+          </a:p>
+          <a:p>
+            <a:r>
+              <a:rPr lang="ru-RU" dirty="0" smtClean="0">
+                <a:solidFill>
+                  <a:srgbClr val="00FFFF"/>
+                </a:solidFill>
+                <a:latin typeface="Courier New" panose="02070309020205020404" pitchFamily="49" charset="0"/>
+                <a:cs typeface="Courier New" panose="02070309020205020404" pitchFamily="49" charset="0"/>
+              </a:rPr>
+              <a:t>В результате был создан действительно </a:t>
+            </a:r>
+            <a:r>
+              <a:rPr lang="ru-RU" b="1" dirty="0" smtClean="0">
+                <a:solidFill>
+                  <a:srgbClr val="00FFFF"/>
+                </a:solidFill>
+                <a:latin typeface="Courier New" panose="02070309020205020404" pitchFamily="49" charset="0"/>
+                <a:cs typeface="Courier New" panose="02070309020205020404" pitchFamily="49" charset="0"/>
+              </a:rPr>
+              <a:t>оригинальный </a:t>
+            </a:r>
+            <a:r>
+              <a:rPr lang="ru-RU" dirty="0" smtClean="0">
+                <a:solidFill>
+                  <a:srgbClr val="00FFFF"/>
+                </a:solidFill>
+                <a:latin typeface="Courier New" panose="02070309020205020404" pitchFamily="49" charset="0"/>
+                <a:cs typeface="Courier New" panose="02070309020205020404" pitchFamily="49" charset="0"/>
+              </a:rPr>
+              <a:t>проект, который, теоретически, можно развить в полноценную игру;</a:t>
+            </a:r>
+          </a:p>
+          <a:p>
+            <a:r>
+              <a:rPr lang="ru-RU" dirty="0" smtClean="0">
+                <a:solidFill>
+                  <a:srgbClr val="00FFFF"/>
+                </a:solidFill>
+                <a:latin typeface="Courier New" panose="02070309020205020404" pitchFamily="49" charset="0"/>
+                <a:cs typeface="Courier New" panose="02070309020205020404" pitchFamily="49" charset="0"/>
+              </a:rPr>
+              <a:t>Я получил удовольствие от разработки игры.</a:t>
+            </a:r>
+            <a:endParaRPr lang="ru-RU" dirty="0">
+              <a:solidFill>
+                <a:srgbClr val="00FFFF"/>
+              </a:solidFill>
+              <a:latin typeface="Courier New" panose="02070309020205020404" pitchFamily="49" charset="0"/>
+              <a:cs typeface="Courier New" panose="02070309020205020404" pitchFamily="49" charset="0"/>
+            </a:endParaRPr>
+          </a:p>
+        </p:txBody>
+      </p:sp>
+    </p:spTree>
+    <p:extLst>
+      <p:ext uri="{BB962C8B-B14F-4D97-AF65-F5344CB8AC3E}">
+        <p14:creationId xmlns:p14="http://schemas.microsoft.com/office/powerpoint/2010/main" val="2165484413"/>
+      </p:ext>
+    </p:extLst>
+  </p:cSld>
+  <p:clrMapOvr>
+    <a:masterClrMapping/>
+  </p:clrMapOvr>
+  <p:transition spd="slow">
+    <p:randomBar/>
+  </p:transition>
+  <p:timing>
+    <p:tnLst>
+      <p:par>
+        <p:cTn id="1" dur="indefinite" restart="never" nodeType="tmRoot"/>
+      </p:par>
+    </p:tnLst>
+  </p:timing>
+</p:sld>
+</file>
+
+<file path=ppt/slides/slide11.xml><?xml version="1.0" encoding="utf-8"?>
+<p:sld xmlns:a="http://schemas.openxmlformats.org/drawingml/2006/main" xmlns:r="http://schemas.openxmlformats.org/officeDocument/2006/relationships" xmlns:p="http://schemas.openxmlformats.org/presentationml/2006/main">
+  <p:cSld>
+    <p:spTree>
+      <p:nvGrpSpPr>
+        <p:cNvPr id="1" name=""/>
+        <p:cNvGrpSpPr/>
+        <p:nvPr/>
+      </p:nvGrpSpPr>
+      <p:grpSpPr>
+        <a:xfrm>
+          <a:off x="0" y="0"/>
+          <a:ext cx="0" cy="0"/>
+          <a:chOff x="0" y="0"/>
+          <a:chExt cx="0" cy="0"/>
+        </a:xfrm>
+      </p:grpSpPr>
+      <p:sp>
+        <p:nvSpPr>
+          <p:cNvPr id="4" name="Заголовок 3"/>
+          <p:cNvSpPr>
+            <a:spLocks noGrp="1"/>
+          </p:cNvSpPr>
+          <p:nvPr>
+            <p:ph type="title"/>
+          </p:nvPr>
+        </p:nvSpPr>
+        <p:spPr>
+          <a:xfrm>
+            <a:off x="909452" y="1695161"/>
+            <a:ext cx="10515600" cy="2769960"/>
+          </a:xfrm>
+        </p:spPr>
+        <p:txBody>
+          <a:bodyPr/>
+          <a:lstStyle/>
+          <a:p>
+            <a:pPr algn="ctr"/>
+            <a:r>
+              <a:rPr lang="en-US" dirty="0" smtClean="0">
+                <a:solidFill>
+                  <a:srgbClr val="00FFFF"/>
+                </a:solidFill>
+                <a:latin typeface="Orbitron" panose="02000000000000000000" pitchFamily="2" charset="0"/>
+                <a:cs typeface="Courier New" panose="02070309020205020404" pitchFamily="49" charset="0"/>
+              </a:rPr>
+              <a:t>Thank you for your attention!</a:t>
+            </a:r>
+            <a:br>
+              <a:rPr lang="en-US" dirty="0" smtClean="0">
+                <a:solidFill>
+                  <a:srgbClr val="00FFFF"/>
+                </a:solidFill>
+                <a:latin typeface="Orbitron" panose="02000000000000000000" pitchFamily="2" charset="0"/>
+                <a:cs typeface="Courier New" panose="02070309020205020404" pitchFamily="49" charset="0"/>
+              </a:rPr>
+            </a:br>
+            <a:r>
+              <a:rPr lang="ru-RU" dirty="0">
+                <a:solidFill>
+                  <a:srgbClr val="00FFFF"/>
+                </a:solidFill>
+                <a:latin typeface="Courier New" panose="02070309020205020404" pitchFamily="49" charset="0"/>
+                <a:cs typeface="Courier New" panose="02070309020205020404" pitchFamily="49" charset="0"/>
+              </a:rPr>
+              <a:t>Спасибо за внимание!</a:t>
+            </a:r>
+          </a:p>
+        </p:txBody>
+      </p:sp>
+    </p:spTree>
+    <p:extLst>
+      <p:ext uri="{BB962C8B-B14F-4D97-AF65-F5344CB8AC3E}">
+        <p14:creationId xmlns:p14="http://schemas.microsoft.com/office/powerpoint/2010/main" val="262075964"/>
+      </p:ext>
+    </p:extLst>
+  </p:cSld>
+  <p:clrMapOvr>
+    <a:masterClrMapping/>
+  </p:clrMapOvr>
+  <p:transition spd="slow">
+    <p:randomBar/>
+  </p:transition>
+  <p:timing>
+    <p:tnLst>
+      <p:par>
+        <p:cTn id="1" dur="indefinite" restart="never" nodeType="tmRoot"/>
+      </p:par>
+    </p:tnLst>
+  </p:timing>
 </p:sld>
 </file>
 
@@ -3138,16 +3497,64 @@
             <p:ph type="title"/>
           </p:nvPr>
         </p:nvSpPr>
-        <p:spPr/>
+        <p:spPr>
+          <a:xfrm>
+            <a:off x="597725" y="662008"/>
+            <a:ext cx="10996550" cy="1325563"/>
+          </a:xfrm>
+        </p:spPr>
         <p:txBody>
           <a:bodyPr/>
           <a:lstStyle/>
           <a:p>
-            <a:r>
-              <a:rPr lang="ru-RU" dirty="0" err="1" smtClean="0"/>
-              <a:t>Черновииииииик</a:t>
-            </a:r>
-            <a:endParaRPr lang="ru-RU" dirty="0"/>
+            <a:pPr algn="ctr"/>
+            <a:r>
+              <a:rPr lang="ru-RU" dirty="0" smtClean="0">
+                <a:solidFill>
+                  <a:srgbClr val="00FFFF"/>
+                </a:solidFill>
+                <a:latin typeface="Courier New" panose="02070309020205020404" pitchFamily="49" charset="0"/>
+                <a:cs typeface="Courier New" panose="02070309020205020404" pitchFamily="49" charset="0"/>
+              </a:rPr>
+              <a:t>Что такое </a:t>
+            </a:r>
+            <a:r>
+              <a:rPr lang="en-US" dirty="0" smtClean="0">
+                <a:solidFill>
+                  <a:srgbClr val="00FFFF"/>
+                </a:solidFill>
+                <a:latin typeface="Courier New" panose="02070309020205020404" pitchFamily="49" charset="0"/>
+                <a:cs typeface="Courier New" panose="02070309020205020404" pitchFamily="49" charset="0"/>
+              </a:rPr>
+              <a:t>“</a:t>
+            </a:r>
+            <a:r>
+              <a:rPr lang="en-US" dirty="0" smtClean="0">
+                <a:solidFill>
+                  <a:srgbClr val="00FFFF"/>
+                </a:solidFill>
+                <a:latin typeface="Orbitron" panose="02000000000000000000" pitchFamily="2" charset="0"/>
+                <a:cs typeface="Courier New" panose="02070309020205020404" pitchFamily="49" charset="0"/>
+              </a:rPr>
+              <a:t>I wanna be a CODER</a:t>
+            </a:r>
+            <a:r>
+              <a:rPr lang="en-US" dirty="0" smtClean="0">
+                <a:solidFill>
+                  <a:srgbClr val="00FFFF"/>
+                </a:solidFill>
+                <a:latin typeface="Courier New" panose="02070309020205020404" pitchFamily="49" charset="0"/>
+                <a:cs typeface="Courier New" panose="02070309020205020404" pitchFamily="49" charset="0"/>
+              </a:rPr>
+              <a:t>”?</a:t>
+            </a:r>
+            <a:endParaRPr lang="ru-RU" dirty="0">
+              <a:solidFill>
+                <a:srgbClr val="00FFFF"/>
+              </a:solidFill>
+              <a:latin typeface="Courier New" panose="02070309020205020404" pitchFamily="49" charset="0"/>
+              <a:cs typeface="Courier New" panose="02070309020205020404" pitchFamily="49" charset="0"/>
+            </a:endParaRPr>
           </a:p>
         </p:txBody>
       </p:sp>
@@ -3161,12 +3568,223 @@
             <p:ph idx="1"/>
           </p:nvPr>
         </p:nvSpPr>
-        <p:spPr/>
+        <p:spPr>
+          <a:xfrm>
+            <a:off x="838200" y="3788228"/>
+            <a:ext cx="10515600" cy="3657601"/>
+          </a:xfrm>
+        </p:spPr>
         <p:txBody>
           <a:bodyPr/>
           <a:lstStyle/>
           <a:p>
-            <a:endParaRPr lang="ru-RU"/>
+            <a:pPr marL="0" indent="0">
+              <a:buNone/>
+            </a:pPr>
+            <a:r>
+              <a:rPr lang="en-US" dirty="0" smtClean="0">
+                <a:solidFill>
+                  <a:srgbClr val="00FFFF"/>
+                </a:solidFill>
+                <a:latin typeface="Courier New" panose="02070309020205020404" pitchFamily="49" charset="0"/>
+                <a:cs typeface="Courier New" panose="02070309020205020404" pitchFamily="49" charset="0"/>
+              </a:rPr>
+              <a:t>“</a:t>
+            </a:r>
+            <a:r>
+              <a:rPr lang="en-US" dirty="0" smtClean="0">
+                <a:solidFill>
+                  <a:srgbClr val="00FFFF"/>
+                </a:solidFill>
+                <a:latin typeface="Orbitron" panose="02000000000000000000" pitchFamily="2" charset="0"/>
+                <a:cs typeface="Courier New" panose="02070309020205020404" pitchFamily="49" charset="0"/>
+              </a:rPr>
+              <a:t>I wanna be a CODER</a:t>
+            </a:r>
+            <a:r>
+              <a:rPr lang="en-US" dirty="0" smtClean="0">
+                <a:solidFill>
+                  <a:srgbClr val="00FFFF"/>
+                </a:solidFill>
+                <a:latin typeface="Courier New" panose="02070309020205020404" pitchFamily="49" charset="0"/>
+                <a:cs typeface="Courier New" panose="02070309020205020404" pitchFamily="49" charset="0"/>
+              </a:rPr>
+              <a:t>”</a:t>
+            </a:r>
+            <a:r>
+              <a:rPr lang="en-US" dirty="0" smtClean="0">
+                <a:solidFill>
+                  <a:srgbClr val="00FFFF"/>
+                </a:solidFill>
+                <a:latin typeface="Orbitron" panose="02000000000000000000" pitchFamily="2" charset="0"/>
+                <a:cs typeface="Courier New" panose="02070309020205020404" pitchFamily="49" charset="0"/>
+              </a:rPr>
+              <a:t> </a:t>
+            </a:r>
+            <a:r>
+              <a:rPr lang="en-US" dirty="0" smtClean="0">
+                <a:solidFill>
+                  <a:srgbClr val="00FFFF"/>
+                </a:solidFill>
+                <a:latin typeface="Courier New" panose="02070309020205020404" pitchFamily="49" charset="0"/>
+                <a:cs typeface="Courier New" panose="02070309020205020404" pitchFamily="49" charset="0"/>
+              </a:rPr>
+              <a:t>– </a:t>
+            </a:r>
+            <a:r>
+              <a:rPr lang="ru-RU" dirty="0" smtClean="0">
+                <a:solidFill>
+                  <a:srgbClr val="00FFFF"/>
+                </a:solidFill>
+                <a:latin typeface="Courier New" panose="02070309020205020404" pitchFamily="49" charset="0"/>
+                <a:cs typeface="Courier New" panose="02070309020205020404" pitchFamily="49" charset="0"/>
+              </a:rPr>
+              <a:t>это </a:t>
+            </a:r>
+            <a:r>
+              <a:rPr lang="en-US" dirty="0" smtClean="0">
+                <a:solidFill>
+                  <a:srgbClr val="00FFFF"/>
+                </a:solidFill>
+                <a:latin typeface="Courier New" panose="02070309020205020404" pitchFamily="49" charset="0"/>
+                <a:cs typeface="Courier New" panose="02070309020205020404" pitchFamily="49" charset="0"/>
+              </a:rPr>
+              <a:t>2D </a:t>
+            </a:r>
+            <a:r>
+              <a:rPr lang="ru-RU" dirty="0" smtClean="0">
+                <a:solidFill>
+                  <a:srgbClr val="00FFFF"/>
+                </a:solidFill>
+                <a:latin typeface="Courier New" panose="02070309020205020404" pitchFamily="49" charset="0"/>
+                <a:cs typeface="Courier New" panose="02070309020205020404" pitchFamily="49" charset="0"/>
+              </a:rPr>
+              <a:t>платформер, в котором </a:t>
+            </a:r>
+            <a:r>
+              <a:rPr lang="ru-RU" dirty="0" smtClean="0">
+                <a:solidFill>
+                  <a:srgbClr val="00FFFF"/>
+                </a:solidFill>
+                <a:latin typeface="Courier New" panose="02070309020205020404" pitchFamily="49" charset="0"/>
+                <a:cs typeface="Courier New" panose="02070309020205020404" pitchFamily="49" charset="0"/>
+              </a:rPr>
+              <a:t>я постарался передать стилистику старых </a:t>
+            </a:r>
+            <a:r>
+              <a:rPr lang="ru-RU" dirty="0" smtClean="0">
+                <a:solidFill>
+                  <a:srgbClr val="00FFFF"/>
+                </a:solidFill>
+                <a:latin typeface="Courier New" panose="02070309020205020404" pitchFamily="49" charset="0"/>
+                <a:cs typeface="Courier New" panose="02070309020205020404" pitchFamily="49" charset="0"/>
+              </a:rPr>
+              <a:t>игр - первых </a:t>
+            </a:r>
+            <a:r>
+              <a:rPr lang="ru-RU" dirty="0" smtClean="0">
+                <a:solidFill>
+                  <a:srgbClr val="00FFFF"/>
+                </a:solidFill>
+                <a:latin typeface="Courier New" panose="02070309020205020404" pitchFamily="49" charset="0"/>
+                <a:cs typeface="Courier New" panose="02070309020205020404" pitchFamily="49" charset="0"/>
+              </a:rPr>
+              <a:t>пиксельных </a:t>
+            </a:r>
+            <a:r>
+              <a:rPr lang="ru-RU" dirty="0" smtClean="0">
+                <a:solidFill>
+                  <a:srgbClr val="00FFFF"/>
+                </a:solidFill>
+                <a:latin typeface="Courier New" panose="02070309020205020404" pitchFamily="49" charset="0"/>
+                <a:cs typeface="Courier New" panose="02070309020205020404" pitchFamily="49" charset="0"/>
+              </a:rPr>
+              <a:t>платформеров</a:t>
+            </a:r>
+            <a:r>
+              <a:rPr lang="ru-RU" dirty="0" smtClean="0">
+                <a:solidFill>
+                  <a:srgbClr val="00FFFF"/>
+                </a:solidFill>
+                <a:latin typeface="Courier New" panose="02070309020205020404" pitchFamily="49" charset="0"/>
+                <a:cs typeface="Courier New" panose="02070309020205020404" pitchFamily="49" charset="0"/>
+              </a:rPr>
+              <a:t>, а именно </a:t>
+            </a:r>
+          </a:p>
+          <a:p>
+            <a:pPr marL="0" indent="0">
+              <a:buNone/>
+            </a:pPr>
+            <a:r>
+              <a:rPr lang="en-US" dirty="0" smtClean="0">
+                <a:solidFill>
+                  <a:srgbClr val="00FFFF"/>
+                </a:solidFill>
+                <a:latin typeface="Courier New" panose="02070309020205020404" pitchFamily="49" charset="0"/>
+                <a:cs typeface="Courier New" panose="02070309020205020404" pitchFamily="49" charset="0"/>
+              </a:rPr>
+              <a:t>“</a:t>
+            </a:r>
+            <a:r>
+              <a:rPr lang="en-US" dirty="0">
+                <a:solidFill>
+                  <a:srgbClr val="00FFFF"/>
+                </a:solidFill>
+                <a:latin typeface="Orbitron" panose="02000000000000000000" pitchFamily="2" charset="0"/>
+                <a:cs typeface="Courier New" panose="02070309020205020404" pitchFamily="49" charset="0"/>
+              </a:rPr>
+              <a:t>I wanna be a </a:t>
+            </a:r>
+            <a:r>
+              <a:rPr lang="en-US" dirty="0" smtClean="0">
+                <a:solidFill>
+                  <a:srgbClr val="00FFFF"/>
+                </a:solidFill>
+                <a:latin typeface="Orbitron" panose="02000000000000000000" pitchFamily="2" charset="0"/>
+                <a:cs typeface="Courier New" panose="02070309020205020404" pitchFamily="49" charset="0"/>
+              </a:rPr>
+              <a:t>Boshy</a:t>
+            </a:r>
+            <a:r>
+              <a:rPr lang="en-US" dirty="0" smtClean="0">
+                <a:solidFill>
+                  <a:srgbClr val="00FFFF"/>
+                </a:solidFill>
+                <a:latin typeface="Courier New" panose="02070309020205020404" pitchFamily="49" charset="0"/>
+                <a:cs typeface="Courier New" panose="02070309020205020404" pitchFamily="49" charset="0"/>
+              </a:rPr>
+              <a:t>”</a:t>
+            </a:r>
+            <a:r>
+              <a:rPr lang="en-US" dirty="0" smtClean="0">
+                <a:solidFill>
+                  <a:srgbClr val="00FFFF"/>
+                </a:solidFill>
+                <a:latin typeface="Orbitron" panose="02000000000000000000" pitchFamily="2" charset="0"/>
+                <a:cs typeface="Courier New" panose="02070309020205020404" pitchFamily="49" charset="0"/>
+              </a:rPr>
+              <a:t> </a:t>
+            </a:r>
+            <a:endParaRPr lang="ru-RU" dirty="0" smtClean="0">
+              <a:solidFill>
+                <a:srgbClr val="00FFFF"/>
+              </a:solidFill>
+              <a:latin typeface="Courier New" panose="02070309020205020404" pitchFamily="49" charset="0"/>
+              <a:cs typeface="Courier New" panose="02070309020205020404" pitchFamily="49" charset="0"/>
+            </a:endParaRPr>
+          </a:p>
+          <a:p>
+            <a:pPr marL="0" indent="0">
+              <a:buNone/>
+            </a:pPr>
+            <a:endParaRPr lang="ru-RU" dirty="0">
+              <a:solidFill>
+                <a:srgbClr val="00FFFF"/>
+              </a:solidFill>
+              <a:latin typeface="Courier New" panose="02070309020205020404" pitchFamily="49" charset="0"/>
+              <a:cs typeface="Courier New" panose="02070309020205020404" pitchFamily="49" charset="0"/>
+            </a:endParaRPr>
           </a:p>
         </p:txBody>
       </p:sp>
@@ -3180,6 +3798,2994 @@
   <p:clrMapOvr>
     <a:masterClrMapping/>
   </p:clrMapOvr>
+  <p:transition spd="slow">
+    <p:randomBar/>
+  </p:transition>
+  <p:timing>
+    <p:tnLst>
+      <p:par>
+        <p:cTn id="1" dur="indefinite" restart="never" nodeType="tmRoot"/>
+      </p:par>
+    </p:tnLst>
+  </p:timing>
+</p:sld>
+</file>
+
+<file path=ppt/slides/slide3.xml><?xml version="1.0" encoding="utf-8"?>
+<p:sld xmlns:a="http://schemas.openxmlformats.org/drawingml/2006/main" xmlns:r="http://schemas.openxmlformats.org/officeDocument/2006/relationships" xmlns:p="http://schemas.openxmlformats.org/presentationml/2006/main">
+  <p:cSld>
+    <p:spTree>
+      <p:nvGrpSpPr>
+        <p:cNvPr id="1" name=""/>
+        <p:cNvGrpSpPr/>
+        <p:nvPr/>
+      </p:nvGrpSpPr>
+      <p:grpSpPr>
+        <a:xfrm>
+          <a:off x="0" y="0"/>
+          <a:ext cx="0" cy="0"/>
+          <a:chOff x="0" y="0"/>
+          <a:chExt cx="0" cy="0"/>
+        </a:xfrm>
+      </p:grpSpPr>
+      <p:sp>
+        <p:nvSpPr>
+          <p:cNvPr id="2" name="Заголовок 1"/>
+          <p:cNvSpPr>
+            <a:spLocks noGrp="1"/>
+          </p:cNvSpPr>
+          <p:nvPr>
+            <p:ph type="title"/>
+          </p:nvPr>
+        </p:nvSpPr>
+        <p:spPr/>
+        <p:txBody>
+          <a:bodyPr/>
+          <a:lstStyle/>
+          <a:p>
+            <a:pPr algn="ctr"/>
+            <a:r>
+              <a:rPr lang="ru-RU" dirty="0" smtClean="0">
+                <a:solidFill>
+                  <a:srgbClr val="00FFFF"/>
+                </a:solidFill>
+                <a:latin typeface="Courier New" panose="02070309020205020404" pitchFamily="49" charset="0"/>
+                <a:cs typeface="Courier New" panose="02070309020205020404" pitchFamily="49" charset="0"/>
+              </a:rPr>
+              <a:t>Доступный контент</a:t>
+            </a:r>
+            <a:endParaRPr lang="ru-RU" dirty="0">
+              <a:solidFill>
+                <a:srgbClr val="00FFFF"/>
+              </a:solidFill>
+              <a:latin typeface="Courier New" panose="02070309020205020404" pitchFamily="49" charset="0"/>
+              <a:cs typeface="Courier New" panose="02070309020205020404" pitchFamily="49" charset="0"/>
+            </a:endParaRPr>
+          </a:p>
+        </p:txBody>
+      </p:sp>
+      <p:sp>
+        <p:nvSpPr>
+          <p:cNvPr id="3" name="Объект 2"/>
+          <p:cNvSpPr>
+            <a:spLocks noGrp="1"/>
+          </p:cNvSpPr>
+          <p:nvPr>
+            <p:ph idx="1"/>
+          </p:nvPr>
+        </p:nvSpPr>
+        <p:spPr>
+          <a:xfrm>
+            <a:off x="446314" y="2042555"/>
+            <a:ext cx="10515600" cy="4098781"/>
+          </a:xfrm>
+        </p:spPr>
+        <p:txBody>
+          <a:bodyPr/>
+          <a:lstStyle/>
+          <a:p>
+            <a:pPr marL="0" indent="0">
+              <a:buNone/>
+            </a:pPr>
+            <a:r>
+              <a:rPr lang="ru-RU" dirty="0" smtClean="0">
+                <a:solidFill>
+                  <a:srgbClr val="00FFFF"/>
+                </a:solidFill>
+                <a:latin typeface="Courier New" panose="02070309020205020404" pitchFamily="49" charset="0"/>
+                <a:cs typeface="Courier New" panose="02070309020205020404" pitchFamily="49" charset="0"/>
+              </a:rPr>
+              <a:t>Итак, в игре доступны:</a:t>
+            </a:r>
+            <a:endParaRPr lang="en-US" dirty="0" smtClean="0">
+              <a:solidFill>
+                <a:srgbClr val="00FFFF"/>
+              </a:solidFill>
+              <a:latin typeface="Courier New" panose="02070309020205020404" pitchFamily="49" charset="0"/>
+              <a:cs typeface="Courier New" panose="02070309020205020404" pitchFamily="49" charset="0"/>
+            </a:endParaRPr>
+          </a:p>
+          <a:p>
+            <a:r>
+              <a:rPr lang="ru-RU" dirty="0" smtClean="0">
+                <a:solidFill>
+                  <a:srgbClr val="00FFFF"/>
+                </a:solidFill>
+                <a:latin typeface="Courier New" panose="02070309020205020404" pitchFamily="49" charset="0"/>
+                <a:cs typeface="Courier New" panose="02070309020205020404" pitchFamily="49" charset="0"/>
+              </a:rPr>
+              <a:t>Главное меню;</a:t>
+            </a:r>
+          </a:p>
+          <a:p>
+            <a:r>
+              <a:rPr lang="ru-RU" dirty="0" smtClean="0">
+                <a:solidFill>
+                  <a:srgbClr val="00FFFF"/>
+                </a:solidFill>
+                <a:latin typeface="Courier New" panose="02070309020205020404" pitchFamily="49" charset="0"/>
+                <a:cs typeface="Courier New" panose="02070309020205020404" pitchFamily="49" charset="0"/>
+              </a:rPr>
+              <a:t>Первый уровень;</a:t>
+            </a:r>
+          </a:p>
+          <a:p>
+            <a:r>
+              <a:rPr lang="ru-RU" dirty="0" smtClean="0">
+                <a:solidFill>
+                  <a:srgbClr val="00FFFF"/>
+                </a:solidFill>
+                <a:latin typeface="Courier New" panose="02070309020205020404" pitchFamily="49" charset="0"/>
+                <a:cs typeface="Courier New" panose="02070309020205020404" pitchFamily="49" charset="0"/>
+              </a:rPr>
+              <a:t>Второй уровень;</a:t>
+            </a:r>
+          </a:p>
+          <a:p>
+            <a:r>
+              <a:rPr lang="ru-RU" dirty="0" smtClean="0">
+                <a:solidFill>
+                  <a:srgbClr val="00FFFF"/>
+                </a:solidFill>
+                <a:latin typeface="Courier New" panose="02070309020205020404" pitchFamily="49" charset="0"/>
+                <a:cs typeface="Courier New" panose="02070309020205020404" pitchFamily="49" charset="0"/>
+              </a:rPr>
+              <a:t>Система сохранений;</a:t>
+            </a:r>
+          </a:p>
+          <a:p>
+            <a:r>
+              <a:rPr lang="ru-RU" dirty="0" smtClean="0">
+                <a:solidFill>
+                  <a:srgbClr val="00FFFF"/>
+                </a:solidFill>
+                <a:latin typeface="Courier New" panose="02070309020205020404" pitchFamily="49" charset="0"/>
+                <a:cs typeface="Courier New" panose="02070309020205020404" pitchFamily="49" charset="0"/>
+              </a:rPr>
+              <a:t>Третий уровень, он же </a:t>
+            </a:r>
+            <a:r>
+              <a:rPr lang="en-US" dirty="0" smtClean="0">
+                <a:solidFill>
+                  <a:srgbClr val="00FFFF"/>
+                </a:solidFill>
+                <a:latin typeface="Courier New" panose="02070309020205020404" pitchFamily="49" charset="0"/>
+                <a:cs typeface="Courier New" panose="02070309020205020404" pitchFamily="49" charset="0"/>
+              </a:rPr>
+              <a:t>“</a:t>
+            </a:r>
+            <a:r>
+              <a:rPr lang="en-US" dirty="0" smtClean="0">
+                <a:solidFill>
+                  <a:srgbClr val="00FFFF"/>
+                </a:solidFill>
+                <a:latin typeface="Orbitron" panose="02000000000000000000" pitchFamily="2" charset="0"/>
+                <a:cs typeface="Courier New" panose="02070309020205020404" pitchFamily="49" charset="0"/>
+              </a:rPr>
+              <a:t>Boss fight</a:t>
+            </a:r>
+            <a:r>
+              <a:rPr lang="en-US" dirty="0" smtClean="0">
+                <a:solidFill>
+                  <a:srgbClr val="00FFFF"/>
+                </a:solidFill>
+                <a:latin typeface="Courier New" panose="02070309020205020404" pitchFamily="49" charset="0"/>
+                <a:cs typeface="Courier New" panose="02070309020205020404" pitchFamily="49" charset="0"/>
+              </a:rPr>
+              <a:t>”</a:t>
+            </a:r>
+            <a:r>
+              <a:rPr lang="ru-RU" dirty="0" smtClean="0">
+                <a:solidFill>
+                  <a:srgbClr val="00FFFF"/>
+                </a:solidFill>
+                <a:latin typeface="Courier New" panose="02070309020205020404" pitchFamily="49" charset="0"/>
+                <a:cs typeface="Courier New" panose="02070309020205020404" pitchFamily="49" charset="0"/>
+              </a:rPr>
+              <a:t>.</a:t>
+            </a:r>
+            <a:endParaRPr lang="en-US" dirty="0" smtClean="0">
+              <a:solidFill>
+                <a:srgbClr val="00FFFF"/>
+              </a:solidFill>
+              <a:latin typeface="Courier New" panose="02070309020205020404" pitchFamily="49" charset="0"/>
+              <a:cs typeface="Courier New" panose="02070309020205020404" pitchFamily="49" charset="0"/>
+            </a:endParaRPr>
+          </a:p>
+          <a:p>
+            <a:pPr marL="0" indent="0">
+              <a:buNone/>
+            </a:pPr>
+            <a:r>
+              <a:rPr lang="ru-RU" dirty="0" smtClean="0">
+                <a:solidFill>
+                  <a:srgbClr val="00FFFF"/>
+                </a:solidFill>
+                <a:latin typeface="Courier New" panose="02070309020205020404" pitchFamily="49" charset="0"/>
+                <a:cs typeface="Courier New" panose="02070309020205020404" pitchFamily="49" charset="0"/>
+              </a:rPr>
+              <a:t>В этой презентации я разберу каждый из этих разделов и расскажу историю разработки.</a:t>
+            </a:r>
+            <a:endParaRPr lang="ru-RU" dirty="0">
+              <a:solidFill>
+                <a:srgbClr val="00FFFF"/>
+              </a:solidFill>
+              <a:latin typeface="Courier New" panose="02070309020205020404" pitchFamily="49" charset="0"/>
+              <a:cs typeface="Courier New" panose="02070309020205020404" pitchFamily="49" charset="0"/>
+            </a:endParaRPr>
+          </a:p>
+        </p:txBody>
+      </p:sp>
+      <p:pic>
+        <p:nvPicPr>
+          <p:cNvPr id="6" name="Рисунок 5"/>
+          <p:cNvPicPr>
+            <a:picLocks noChangeAspect="1"/>
+          </p:cNvPicPr>
+          <p:nvPr/>
+        </p:nvPicPr>
+        <p:blipFill>
+          <a:blip r:embed="rId2"/>
+          <a:stretch>
+            <a:fillRect/>
+          </a:stretch>
+        </p:blipFill>
+        <p:spPr>
+          <a:xfrm>
+            <a:off x="6918180" y="888216"/>
+            <a:ext cx="375129" cy="346818"/>
+          </a:xfrm>
+          <a:prstGeom prst="rect">
+            <a:avLst/>
+          </a:prstGeom>
+        </p:spPr>
+      </p:pic>
+    </p:spTree>
+    <p:extLst>
+      <p:ext uri="{BB962C8B-B14F-4D97-AF65-F5344CB8AC3E}">
+        <p14:creationId xmlns:p14="http://schemas.microsoft.com/office/powerpoint/2010/main" val="2149565937"/>
+      </p:ext>
+    </p:extLst>
+  </p:cSld>
+  <p:clrMapOvr>
+    <a:masterClrMapping/>
+  </p:clrMapOvr>
+  <p:transition spd="slow">
+    <p:randomBar/>
+  </p:transition>
+  <p:timing>
+    <p:tnLst>
+      <p:par>
+        <p:cTn id="1" dur="indefinite" restart="never" nodeType="tmRoot"/>
+      </p:par>
+    </p:tnLst>
+  </p:timing>
+</p:sld>
+</file>
+
+<file path=ppt/slides/slide4.xml><?xml version="1.0" encoding="utf-8"?>
+<p:sld xmlns:a="http://schemas.openxmlformats.org/drawingml/2006/main" xmlns:r="http://schemas.openxmlformats.org/officeDocument/2006/relationships" xmlns:p="http://schemas.openxmlformats.org/presentationml/2006/main">
+  <p:cSld>
+    <p:spTree>
+      <p:nvGrpSpPr>
+        <p:cNvPr id="1" name=""/>
+        <p:cNvGrpSpPr/>
+        <p:nvPr/>
+      </p:nvGrpSpPr>
+      <p:grpSpPr>
+        <a:xfrm>
+          <a:off x="0" y="0"/>
+          <a:ext cx="0" cy="0"/>
+          <a:chOff x="0" y="0"/>
+          <a:chExt cx="0" cy="0"/>
+        </a:xfrm>
+      </p:grpSpPr>
+      <p:sp>
+        <p:nvSpPr>
+          <p:cNvPr id="2" name="Заголовок 1"/>
+          <p:cNvSpPr>
+            <a:spLocks noGrp="1"/>
+          </p:cNvSpPr>
+          <p:nvPr>
+            <p:ph type="title"/>
+          </p:nvPr>
+        </p:nvSpPr>
+        <p:spPr/>
+        <p:txBody>
+          <a:bodyPr/>
+          <a:lstStyle/>
+          <a:p>
+            <a:pPr algn="ctr"/>
+            <a:r>
+              <a:rPr lang="ru-RU" dirty="0" smtClean="0">
+                <a:solidFill>
+                  <a:srgbClr val="00FFFF"/>
+                </a:solidFill>
+                <a:latin typeface="Courier New" panose="02070309020205020404" pitchFamily="49" charset="0"/>
+                <a:cs typeface="Courier New" panose="02070309020205020404" pitchFamily="49" charset="0"/>
+              </a:rPr>
+              <a:t>Минутка </a:t>
+            </a:r>
+            <a:r>
+              <a:rPr lang="en-US" dirty="0" smtClean="0">
+                <a:solidFill>
+                  <a:srgbClr val="00FFFF"/>
+                </a:solidFill>
+                <a:latin typeface="Courier New" panose="02070309020205020404" pitchFamily="49" charset="0"/>
+                <a:cs typeface="Courier New" panose="02070309020205020404" pitchFamily="49" charset="0"/>
+              </a:rPr>
+              <a:t>“</a:t>
+            </a:r>
+            <a:r>
+              <a:rPr lang="ru-RU" dirty="0" smtClean="0">
+                <a:solidFill>
+                  <a:srgbClr val="00FFFF"/>
+                </a:solidFill>
+                <a:latin typeface="Courier New" panose="02070309020205020404" pitchFamily="49" charset="0"/>
+                <a:cs typeface="Courier New" panose="02070309020205020404" pitchFamily="49" charset="0"/>
+              </a:rPr>
+              <a:t>лора</a:t>
+            </a:r>
+            <a:r>
+              <a:rPr lang="en-US" dirty="0" smtClean="0">
+                <a:solidFill>
+                  <a:srgbClr val="00FFFF"/>
+                </a:solidFill>
+                <a:latin typeface="Courier New" panose="02070309020205020404" pitchFamily="49" charset="0"/>
+                <a:cs typeface="Courier New" panose="02070309020205020404" pitchFamily="49" charset="0"/>
+              </a:rPr>
+              <a:t>”</a:t>
+            </a:r>
+            <a:r>
+              <a:rPr lang="ru-RU" dirty="0" smtClean="0">
+                <a:solidFill>
+                  <a:srgbClr val="00FFFF"/>
+                </a:solidFill>
+                <a:latin typeface="Courier New" panose="02070309020205020404" pitchFamily="49" charset="0"/>
+                <a:cs typeface="Courier New" panose="02070309020205020404" pitchFamily="49" charset="0"/>
+              </a:rPr>
+              <a:t> игры</a:t>
+            </a:r>
+            <a:endParaRPr lang="ru-RU" dirty="0">
+              <a:solidFill>
+                <a:srgbClr val="00FFFF"/>
+              </a:solidFill>
+              <a:latin typeface="Courier New" panose="02070309020205020404" pitchFamily="49" charset="0"/>
+              <a:cs typeface="Courier New" panose="02070309020205020404" pitchFamily="49" charset="0"/>
+            </a:endParaRPr>
+          </a:p>
+        </p:txBody>
+      </p:sp>
+      <p:sp>
+        <p:nvSpPr>
+          <p:cNvPr id="3" name="Объект 2"/>
+          <p:cNvSpPr>
+            <a:spLocks noGrp="1"/>
+          </p:cNvSpPr>
+          <p:nvPr>
+            <p:ph idx="1"/>
+          </p:nvPr>
+        </p:nvSpPr>
+        <p:spPr>
+          <a:xfrm>
+            <a:off x="5795158" y="1493116"/>
+            <a:ext cx="5986153" cy="5145190"/>
+          </a:xfrm>
+        </p:spPr>
+        <p:txBody>
+          <a:bodyPr>
+            <a:normAutofit lnSpcReduction="10000"/>
+          </a:bodyPr>
+          <a:lstStyle/>
+          <a:p>
+            <a:pPr algn="r">
+              <a:buFontTx/>
+              <a:buChar char="-"/>
+            </a:pPr>
+            <a:r>
+              <a:rPr lang="ru-RU" sz="1400" dirty="0" smtClean="0">
+                <a:solidFill>
+                  <a:srgbClr val="00FFFF"/>
+                </a:solidFill>
+                <a:latin typeface="Courier New" panose="02070309020205020404" pitchFamily="49" charset="0"/>
+                <a:cs typeface="Courier New" panose="02070309020205020404" pitchFamily="49" charset="0"/>
+              </a:rPr>
+              <a:t>Это сюжет!</a:t>
+            </a:r>
+          </a:p>
+          <a:p>
+            <a:pPr marL="0" indent="0" algn="r">
+              <a:buNone/>
+            </a:pPr>
+            <a:endParaRPr lang="ru-RU" sz="1400" dirty="0" smtClean="0">
+              <a:solidFill>
+                <a:srgbClr val="00FFFF"/>
+              </a:solidFill>
+              <a:latin typeface="Courier New" panose="02070309020205020404" pitchFamily="49" charset="0"/>
+              <a:cs typeface="Courier New" panose="02070309020205020404" pitchFamily="49" charset="0"/>
+            </a:endParaRPr>
+          </a:p>
+          <a:p>
+            <a:pPr algn="r">
+              <a:buFontTx/>
+              <a:buChar char="-"/>
+            </a:pPr>
+            <a:r>
+              <a:rPr lang="ru-RU" sz="1400" dirty="0" smtClean="0">
+                <a:solidFill>
+                  <a:srgbClr val="00FFFF"/>
+                </a:solidFill>
+                <a:latin typeface="Courier New" panose="02070309020205020404" pitchFamily="49" charset="0"/>
+                <a:cs typeface="Courier New" panose="02070309020205020404" pitchFamily="49" charset="0"/>
+              </a:rPr>
+              <a:t>Нет, кое-что получше.</a:t>
+            </a:r>
+          </a:p>
+          <a:p>
+            <a:pPr marL="0" indent="0" algn="r">
+              <a:buNone/>
+            </a:pPr>
+            <a:r>
+              <a:rPr lang="ru-RU" sz="1400" dirty="0" smtClean="0">
+                <a:solidFill>
+                  <a:srgbClr val="00FFFF"/>
+                </a:solidFill>
+                <a:latin typeface="Courier New" panose="02070309020205020404" pitchFamily="49" charset="0"/>
+                <a:cs typeface="Courier New" panose="02070309020205020404" pitchFamily="49" charset="0"/>
+              </a:rPr>
+              <a:t>Это рисунок сюжета!</a:t>
+            </a:r>
+          </a:p>
+          <a:p>
+            <a:pPr marL="0" indent="0">
+              <a:buNone/>
+            </a:pPr>
+            <a:endParaRPr lang="ru-RU" sz="2000" dirty="0">
+              <a:solidFill>
+                <a:srgbClr val="00FFFF"/>
+              </a:solidFill>
+              <a:latin typeface="Courier New" panose="02070309020205020404" pitchFamily="49" charset="0"/>
+              <a:cs typeface="Courier New" panose="02070309020205020404" pitchFamily="49" charset="0"/>
+            </a:endParaRPr>
+          </a:p>
+          <a:p>
+            <a:pPr marL="0" indent="0">
+              <a:buNone/>
+            </a:pPr>
+            <a:r>
+              <a:rPr lang="ru-RU" sz="2000" dirty="0" smtClean="0">
+                <a:solidFill>
+                  <a:srgbClr val="00FFFF"/>
+                </a:solidFill>
+                <a:latin typeface="Courier New" panose="02070309020205020404" pitchFamily="49" charset="0"/>
+                <a:cs typeface="Courier New" panose="02070309020205020404" pitchFamily="49" charset="0"/>
+              </a:rPr>
+              <a:t>К проекту я решил подойти с долей иронии, поэтому обыграл уровни как этапы обучения в нашем </a:t>
+            </a:r>
+            <a:r>
+              <a:rPr lang="ru-RU" sz="2000" b="1" dirty="0" smtClean="0">
+                <a:solidFill>
+                  <a:srgbClr val="00FFFF"/>
+                </a:solidFill>
+                <a:latin typeface="Courier New" panose="02070309020205020404" pitchFamily="49" charset="0"/>
+                <a:cs typeface="Courier New" panose="02070309020205020404" pitchFamily="49" charset="0"/>
+              </a:rPr>
+              <a:t>Яндекс</a:t>
+            </a:r>
+            <a:r>
+              <a:rPr lang="en-US" sz="2000" dirty="0" smtClean="0">
+                <a:solidFill>
+                  <a:srgbClr val="00FFFF"/>
+                </a:solidFill>
+                <a:latin typeface="Courier New" panose="02070309020205020404" pitchFamily="49" charset="0"/>
+                <a:cs typeface="Courier New" panose="02070309020205020404" pitchFamily="49" charset="0"/>
+              </a:rPr>
+              <a:t>.</a:t>
+            </a:r>
+            <a:r>
+              <a:rPr lang="ru-RU" sz="2000" b="1" dirty="0" smtClean="0">
+                <a:solidFill>
+                  <a:srgbClr val="00FFFF"/>
+                </a:solidFill>
+                <a:latin typeface="Courier New" panose="02070309020205020404" pitchFamily="49" charset="0"/>
+                <a:cs typeface="Courier New" panose="02070309020205020404" pitchFamily="49" charset="0"/>
+              </a:rPr>
+              <a:t>Лицее</a:t>
+            </a:r>
+            <a:r>
+              <a:rPr lang="ru-RU" sz="2000" dirty="0" smtClean="0">
+                <a:solidFill>
+                  <a:srgbClr val="00FFFF"/>
+                </a:solidFill>
+                <a:latin typeface="Courier New" panose="02070309020205020404" pitchFamily="49" charset="0"/>
+                <a:cs typeface="Courier New" panose="02070309020205020404" pitchFamily="49" charset="0"/>
+              </a:rPr>
+              <a:t>. Сюжет подаётся в экранах перед каждым уровнем: где на первом ты принимаешь решения, которые одобрил бы </a:t>
+            </a:r>
+            <a:r>
+              <a:rPr lang="en-US" sz="2000" dirty="0" smtClean="0">
+                <a:solidFill>
+                  <a:srgbClr val="00FFFF"/>
+                </a:solidFill>
+                <a:latin typeface="Orbitron" panose="02000000000000000000" pitchFamily="2" charset="0"/>
+                <a:cs typeface="Courier New" panose="02070309020205020404" pitchFamily="49" charset="0"/>
+              </a:rPr>
+              <a:t>PREPOD</a:t>
+            </a:r>
+            <a:r>
+              <a:rPr lang="ru-RU" sz="2000" dirty="0">
+                <a:solidFill>
+                  <a:srgbClr val="00FFFF"/>
+                </a:solidFill>
+                <a:latin typeface="Courier New" panose="02070309020205020404" pitchFamily="49" charset="0"/>
+                <a:cs typeface="Courier New" panose="02070309020205020404" pitchFamily="49" charset="0"/>
+              </a:rPr>
+              <a:t> </a:t>
+            </a:r>
+            <a:r>
+              <a:rPr lang="ru-RU" sz="2000" dirty="0" smtClean="0">
+                <a:solidFill>
+                  <a:srgbClr val="00FFFF"/>
+                </a:solidFill>
+                <a:latin typeface="Courier New" panose="02070309020205020404" pitchFamily="49" charset="0"/>
+                <a:cs typeface="Courier New" panose="02070309020205020404" pitchFamily="49" charset="0"/>
+              </a:rPr>
+              <a:t>– пойти решать задачи или играть в Доту и т.д.; на втором – разрабатываешь свой проект, на который выделено </a:t>
+            </a:r>
+            <a:r>
+              <a:rPr lang="en-US" sz="2000" dirty="0" smtClean="0">
+                <a:solidFill>
+                  <a:srgbClr val="00FF00"/>
+                </a:solidFill>
+                <a:latin typeface="Orbitron" panose="02000000000000000000" pitchFamily="2" charset="0"/>
+                <a:cs typeface="Courier New" panose="02070309020205020404" pitchFamily="49" charset="0"/>
+              </a:rPr>
+              <a:t>30</a:t>
+            </a:r>
+            <a:r>
+              <a:rPr lang="ru-RU" sz="2000" dirty="0" smtClean="0">
+                <a:solidFill>
+                  <a:srgbClr val="00FFFF"/>
+                </a:solidFill>
+                <a:latin typeface="Courier New" panose="02070309020205020404" pitchFamily="49" charset="0"/>
+                <a:cs typeface="Courier New" panose="02070309020205020404" pitchFamily="49" charset="0"/>
+              </a:rPr>
+              <a:t> дней; а финальным боссом игры как раз является </a:t>
+            </a:r>
+            <a:r>
+              <a:rPr lang="en-US" sz="2000" dirty="0" smtClean="0">
+                <a:solidFill>
+                  <a:srgbClr val="FF0000"/>
+                </a:solidFill>
+                <a:latin typeface="Orbitron" panose="02000000000000000000" pitchFamily="2" charset="0"/>
+                <a:cs typeface="Courier New" panose="02070309020205020404" pitchFamily="49" charset="0"/>
+              </a:rPr>
+              <a:t>the PREPOD</a:t>
+            </a:r>
+            <a:r>
+              <a:rPr lang="ru-RU" sz="2000" dirty="0" smtClean="0">
+                <a:solidFill>
+                  <a:srgbClr val="00FFFF"/>
+                </a:solidFill>
+                <a:latin typeface="Courier New" panose="02070309020205020404" pitchFamily="49" charset="0"/>
+                <a:cs typeface="Courier New" panose="02070309020205020404" pitchFamily="49" charset="0"/>
+              </a:rPr>
+              <a:t>. Кем он будет – жестоким противником или другом, зависит только от игрока. </a:t>
+            </a:r>
+            <a:r>
+              <a:rPr lang="en-US" sz="2000" dirty="0" smtClean="0">
+                <a:solidFill>
+                  <a:srgbClr val="00FFFF"/>
+                </a:solidFill>
+                <a:latin typeface="Orbitron" panose="02000000000000000000" pitchFamily="2" charset="0"/>
+                <a:cs typeface="Courier New" panose="02070309020205020404" pitchFamily="49" charset="0"/>
+              </a:rPr>
+              <a:t>Git gud.</a:t>
+            </a:r>
+            <a:endParaRPr lang="ru-RU" sz="2000" b="1" dirty="0">
+              <a:solidFill>
+                <a:srgbClr val="00FFFF"/>
+              </a:solidFill>
+              <a:latin typeface="Courier New" panose="02070309020205020404" pitchFamily="49" charset="0"/>
+              <a:cs typeface="Courier New" panose="02070309020205020404" pitchFamily="49" charset="0"/>
+            </a:endParaRPr>
+          </a:p>
+        </p:txBody>
+      </p:sp>
+      <p:pic>
+        <p:nvPicPr>
+          <p:cNvPr id="4" name="Рисунок 3"/>
+          <p:cNvPicPr>
+            <a:picLocks noChangeAspect="1"/>
+          </p:cNvPicPr>
+          <p:nvPr/>
+        </p:nvPicPr>
+        <p:blipFill>
+          <a:blip r:embed="rId2"/>
+          <a:stretch>
+            <a:fillRect/>
+          </a:stretch>
+        </p:blipFill>
+        <p:spPr>
+          <a:xfrm>
+            <a:off x="139968" y="1232023"/>
+            <a:ext cx="4196225" cy="3114345"/>
+          </a:xfrm>
+          <a:prstGeom prst="rect">
+            <a:avLst/>
+          </a:prstGeom>
+        </p:spPr>
+      </p:pic>
+      <p:pic>
+        <p:nvPicPr>
+          <p:cNvPr id="5" name="Рисунок 4"/>
+          <p:cNvPicPr>
+            <a:picLocks noChangeAspect="1"/>
+          </p:cNvPicPr>
+          <p:nvPr/>
+        </p:nvPicPr>
+        <p:blipFill>
+          <a:blip r:embed="rId3"/>
+          <a:stretch>
+            <a:fillRect/>
+          </a:stretch>
+        </p:blipFill>
+        <p:spPr>
+          <a:xfrm>
+            <a:off x="2169323" y="2996323"/>
+            <a:ext cx="3625835" cy="2700090"/>
+          </a:xfrm>
+          <a:prstGeom prst="rect">
+            <a:avLst/>
+          </a:prstGeom>
+        </p:spPr>
+      </p:pic>
+      <p:pic>
+        <p:nvPicPr>
+          <p:cNvPr id="6" name="Рисунок 5"/>
+          <p:cNvPicPr>
+            <a:picLocks noChangeAspect="1"/>
+          </p:cNvPicPr>
+          <p:nvPr/>
+        </p:nvPicPr>
+        <p:blipFill>
+          <a:blip r:embed="rId4"/>
+          <a:stretch>
+            <a:fillRect/>
+          </a:stretch>
+        </p:blipFill>
+        <p:spPr>
+          <a:xfrm>
+            <a:off x="328922" y="4174485"/>
+            <a:ext cx="3497553" cy="2612262"/>
+          </a:xfrm>
+          <a:prstGeom prst="rect">
+            <a:avLst/>
+          </a:prstGeom>
+        </p:spPr>
+      </p:pic>
+    </p:spTree>
+    <p:extLst>
+      <p:ext uri="{BB962C8B-B14F-4D97-AF65-F5344CB8AC3E}">
+        <p14:creationId xmlns:p14="http://schemas.microsoft.com/office/powerpoint/2010/main" val="2555391517"/>
+      </p:ext>
+    </p:extLst>
+  </p:cSld>
+  <p:clrMapOvr>
+    <a:masterClrMapping/>
+  </p:clrMapOvr>
+  <p:transition spd="slow">
+    <p:randomBar/>
+  </p:transition>
+</p:sld>
+</file>
+
+<file path=ppt/slides/slide5.xml><?xml version="1.0" encoding="utf-8"?>
+<p:sld xmlns:a="http://schemas.openxmlformats.org/drawingml/2006/main" xmlns:r="http://schemas.openxmlformats.org/officeDocument/2006/relationships" xmlns:p="http://schemas.openxmlformats.org/presentationml/2006/main">
+  <p:cSld>
+    <p:spTree>
+      <p:nvGrpSpPr>
+        <p:cNvPr id="1" name=""/>
+        <p:cNvGrpSpPr/>
+        <p:nvPr/>
+      </p:nvGrpSpPr>
+      <p:grpSpPr>
+        <a:xfrm>
+          <a:off x="0" y="0"/>
+          <a:ext cx="0" cy="0"/>
+          <a:chOff x="0" y="0"/>
+          <a:chExt cx="0" cy="0"/>
+        </a:xfrm>
+      </p:grpSpPr>
+      <p:sp>
+        <p:nvSpPr>
+          <p:cNvPr id="6" name="Текст 5"/>
+          <p:cNvSpPr>
+            <a:spLocks noGrp="1"/>
+          </p:cNvSpPr>
+          <p:nvPr>
+            <p:ph type="body" sz="half" idx="2"/>
+          </p:nvPr>
+        </p:nvSpPr>
+        <p:spPr>
+          <a:xfrm>
+            <a:off x="8704262" y="1257300"/>
+            <a:ext cx="2675307" cy="4862118"/>
+          </a:xfrm>
+        </p:spPr>
+        <p:txBody>
+          <a:bodyPr>
+            <a:normAutofit/>
+          </a:bodyPr>
+          <a:lstStyle/>
+          <a:p>
+            <a:r>
+              <a:rPr lang="ru-RU" dirty="0" smtClean="0">
+                <a:solidFill>
+                  <a:srgbClr val="00FFFF"/>
+                </a:solidFill>
+                <a:latin typeface="Courier New" panose="02070309020205020404" pitchFamily="49" charset="0"/>
+                <a:cs typeface="Courier New" panose="02070309020205020404" pitchFamily="49" charset="0"/>
+              </a:rPr>
+              <a:t>На этом слайде вы можете видеть схему главного меню:</a:t>
+            </a:r>
+            <a:endParaRPr lang="en-US" dirty="0" smtClean="0">
+              <a:solidFill>
+                <a:srgbClr val="00FFFF"/>
+              </a:solidFill>
+              <a:latin typeface="Courier New" panose="02070309020205020404" pitchFamily="49" charset="0"/>
+              <a:cs typeface="Courier New" panose="02070309020205020404" pitchFamily="49" charset="0"/>
+            </a:endParaRPr>
+          </a:p>
+          <a:p>
+            <a:endParaRPr lang="en-US" dirty="0">
+              <a:solidFill>
+                <a:srgbClr val="00FFFF"/>
+              </a:solidFill>
+              <a:latin typeface="Courier New" panose="02070309020205020404" pitchFamily="49" charset="0"/>
+              <a:cs typeface="Courier New" panose="02070309020205020404" pitchFamily="49" charset="0"/>
+            </a:endParaRPr>
+          </a:p>
+          <a:p>
+            <a:pPr marL="342900" indent="-342900">
+              <a:buFont typeface="+mj-lt"/>
+              <a:buAutoNum type="arabicPeriod"/>
+            </a:pPr>
+            <a:r>
+              <a:rPr lang="ru-RU" dirty="0" smtClean="0">
+                <a:solidFill>
+                  <a:srgbClr val="00FFFF"/>
+                </a:solidFill>
+                <a:latin typeface="Courier New" panose="02070309020205020404" pitchFamily="49" charset="0"/>
+                <a:cs typeface="Courier New" panose="02070309020205020404" pitchFamily="49" charset="0"/>
+              </a:rPr>
+              <a:t>Кнопки выбора уровня</a:t>
+            </a:r>
+          </a:p>
+          <a:p>
+            <a:pPr marL="342900" indent="-342900">
+              <a:buFont typeface="+mj-lt"/>
+              <a:buAutoNum type="arabicPeriod"/>
+            </a:pPr>
+            <a:r>
+              <a:rPr lang="ru-RU" dirty="0" smtClean="0">
+                <a:solidFill>
+                  <a:srgbClr val="00FFFF"/>
+                </a:solidFill>
+                <a:latin typeface="Courier New" panose="02070309020205020404" pitchFamily="49" charset="0"/>
+                <a:cs typeface="Courier New" panose="02070309020205020404" pitchFamily="49" charset="0"/>
+              </a:rPr>
+              <a:t>Кнопка, на которую наведён курсор</a:t>
+            </a:r>
+          </a:p>
+          <a:p>
+            <a:pPr marL="342900" indent="-342900">
+              <a:buFont typeface="+mj-lt"/>
+              <a:buAutoNum type="arabicPeriod"/>
+            </a:pPr>
+            <a:r>
+              <a:rPr lang="ru-RU" dirty="0" smtClean="0">
+                <a:solidFill>
+                  <a:srgbClr val="00FFFF"/>
+                </a:solidFill>
+                <a:latin typeface="Courier New" panose="02070309020205020404" pitchFamily="49" charset="0"/>
+                <a:cs typeface="Courier New" panose="02070309020205020404" pitchFamily="49" charset="0"/>
+              </a:rPr>
+              <a:t>Индикатор блокировки уровня </a:t>
+            </a:r>
+            <a:r>
+              <a:rPr lang="ru-RU" dirty="0" smtClean="0">
+                <a:solidFill>
+                  <a:srgbClr val="00FFFF"/>
+                </a:solidFill>
+                <a:latin typeface="Courier New" panose="02070309020205020404" pitchFamily="49" charset="0"/>
+                <a:cs typeface="Courier New" panose="02070309020205020404" pitchFamily="49" charset="0"/>
+              </a:rPr>
+              <a:t>босса, который снимается прохождением предыдущих уровней</a:t>
+            </a:r>
+            <a:endParaRPr lang="ru-RU" dirty="0" smtClean="0">
+              <a:solidFill>
+                <a:srgbClr val="00FFFF"/>
+              </a:solidFill>
+              <a:latin typeface="Courier New" panose="02070309020205020404" pitchFamily="49" charset="0"/>
+              <a:cs typeface="Courier New" panose="02070309020205020404" pitchFamily="49" charset="0"/>
+            </a:endParaRPr>
+          </a:p>
+          <a:p>
+            <a:pPr marL="342900" indent="-342900">
+              <a:buFont typeface="+mj-lt"/>
+              <a:buAutoNum type="arabicPeriod"/>
+            </a:pPr>
+            <a:r>
+              <a:rPr lang="ru-RU" dirty="0" smtClean="0">
+                <a:solidFill>
+                  <a:srgbClr val="00FFFF"/>
+                </a:solidFill>
+                <a:latin typeface="Courier New" panose="02070309020205020404" pitchFamily="49" charset="0"/>
+                <a:cs typeface="Courier New" panose="02070309020205020404" pitchFamily="49" charset="0"/>
+              </a:rPr>
+              <a:t>Кнопка для входа в меню сохранения</a:t>
+            </a:r>
+            <a:endParaRPr lang="ru-RU" dirty="0">
+              <a:solidFill>
+                <a:srgbClr val="00FFFF"/>
+              </a:solidFill>
+              <a:latin typeface="Courier New" panose="02070309020205020404" pitchFamily="49" charset="0"/>
+              <a:cs typeface="Courier New" panose="02070309020205020404" pitchFamily="49" charset="0"/>
+            </a:endParaRPr>
+          </a:p>
+        </p:txBody>
+      </p:sp>
+      <p:sp>
+        <p:nvSpPr>
+          <p:cNvPr id="8" name="Заголовок 7"/>
+          <p:cNvSpPr>
+            <a:spLocks noGrp="1"/>
+          </p:cNvSpPr>
+          <p:nvPr>
+            <p:ph type="title"/>
+          </p:nvPr>
+        </p:nvSpPr>
+        <p:spPr/>
+        <p:txBody>
+          <a:bodyPr/>
+          <a:lstStyle/>
+          <a:p>
+            <a:endParaRPr lang="ru-RU" dirty="0"/>
+          </a:p>
+        </p:txBody>
+      </p:sp>
+      <p:pic>
+        <p:nvPicPr>
+          <p:cNvPr id="28" name="Объект 27"/>
+          <p:cNvPicPr>
+            <a:picLocks noGrp="1" noChangeAspect="1"/>
+          </p:cNvPicPr>
+          <p:nvPr>
+            <p:ph idx="1"/>
+          </p:nvPr>
+        </p:nvPicPr>
+        <p:blipFill>
+          <a:blip r:embed="rId2"/>
+          <a:stretch>
+            <a:fillRect/>
+          </a:stretch>
+        </p:blipFill>
+        <p:spPr>
+          <a:xfrm>
+            <a:off x="621489" y="326572"/>
+            <a:ext cx="7832295" cy="5877458"/>
+          </a:xfrm>
+          <a:prstGeom prst="rect">
+            <a:avLst/>
+          </a:prstGeom>
+        </p:spPr>
+      </p:pic>
+      <p:sp>
+        <p:nvSpPr>
+          <p:cNvPr id="29" name="Левая фигурная скобка 28"/>
+          <p:cNvSpPr/>
+          <p:nvPr/>
+        </p:nvSpPr>
+        <p:spPr>
+          <a:xfrm>
+            <a:off x="709160" y="2303812"/>
+            <a:ext cx="712519" cy="961902"/>
+          </a:xfrm>
+          <a:prstGeom prst="leftBrace">
+            <a:avLst/>
+          </a:prstGeom>
+        </p:spPr>
+        <p:style>
+          <a:lnRef idx="1">
+            <a:schemeClr val="accent1"/>
+          </a:lnRef>
+          <a:fillRef idx="0">
+            <a:schemeClr val="accent1"/>
+          </a:fillRef>
+          <a:effectRef idx="0">
+            <a:schemeClr val="accent1"/>
+          </a:effectRef>
+          <a:fontRef idx="minor">
+            <a:schemeClr val="tx1"/>
+          </a:fontRef>
+        </p:style>
+        <p:txBody>
+          <a:bodyPr rtlCol="0" anchor="ctr"/>
+          <a:lstStyle/>
+          <a:p>
+            <a:pPr algn="ctr"/>
+            <a:endParaRPr lang="ru-RU"/>
+          </a:p>
+        </p:txBody>
+      </p:sp>
+      <p:sp>
+        <p:nvSpPr>
+          <p:cNvPr id="30" name="Правая фигурная скобка 29"/>
+          <p:cNvSpPr/>
+          <p:nvPr/>
+        </p:nvSpPr>
+        <p:spPr>
+          <a:xfrm>
+            <a:off x="3730114" y="2303812"/>
+            <a:ext cx="807522" cy="3253839"/>
+          </a:xfrm>
+          <a:prstGeom prst="rightBrace">
+            <a:avLst/>
+          </a:prstGeom>
+        </p:spPr>
+        <p:style>
+          <a:lnRef idx="1">
+            <a:schemeClr val="accent1"/>
+          </a:lnRef>
+          <a:fillRef idx="0">
+            <a:schemeClr val="accent1"/>
+          </a:fillRef>
+          <a:effectRef idx="0">
+            <a:schemeClr val="accent1"/>
+          </a:effectRef>
+          <a:fontRef idx="minor">
+            <a:schemeClr val="tx1"/>
+          </a:fontRef>
+        </p:style>
+        <p:txBody>
+          <a:bodyPr rtlCol="0" anchor="ctr"/>
+          <a:lstStyle/>
+          <a:p>
+            <a:pPr algn="ctr"/>
+            <a:endParaRPr lang="ru-RU"/>
+          </a:p>
+        </p:txBody>
+      </p:sp>
+      <p:cxnSp>
+        <p:nvCxnSpPr>
+          <p:cNvPr id="32" name="Соединительная линия уступом 31"/>
+          <p:cNvCxnSpPr/>
+          <p:nvPr/>
+        </p:nvCxnSpPr>
+        <p:spPr>
+          <a:xfrm>
+            <a:off x="6092042" y="4500746"/>
+            <a:ext cx="1306285" cy="771897"/>
+          </a:xfrm>
+          <a:prstGeom prst="bentConnector3">
+            <a:avLst/>
+          </a:prstGeom>
+          <a:ln>
+            <a:tailEnd type="triangle"/>
+          </a:ln>
+        </p:spPr>
+        <p:style>
+          <a:lnRef idx="1">
+            <a:schemeClr val="accent1"/>
+          </a:lnRef>
+          <a:fillRef idx="0">
+            <a:schemeClr val="accent1"/>
+          </a:fillRef>
+          <a:effectRef idx="0">
+            <a:schemeClr val="accent1"/>
+          </a:effectRef>
+          <a:fontRef idx="minor">
+            <a:schemeClr val="tx1"/>
+          </a:fontRef>
+        </p:style>
+      </p:cxnSp>
+      <p:cxnSp>
+        <p:nvCxnSpPr>
+          <p:cNvPr id="35" name="Соединительная линия уступом 34"/>
+          <p:cNvCxnSpPr/>
+          <p:nvPr/>
+        </p:nvCxnSpPr>
+        <p:spPr>
+          <a:xfrm rot="10800000" flipV="1">
+            <a:off x="621489" y="1953492"/>
+            <a:ext cx="893652" cy="831271"/>
+          </a:xfrm>
+          <a:prstGeom prst="bentConnector3">
+            <a:avLst>
+              <a:gd name="adj1" fmla="val 145677"/>
+            </a:avLst>
+          </a:prstGeom>
+          <a:ln>
+            <a:tailEnd type="triangle"/>
+          </a:ln>
+        </p:spPr>
+        <p:style>
+          <a:lnRef idx="1">
+            <a:schemeClr val="accent1"/>
+          </a:lnRef>
+          <a:fillRef idx="0">
+            <a:schemeClr val="accent1"/>
+          </a:fillRef>
+          <a:effectRef idx="0">
+            <a:schemeClr val="accent1"/>
+          </a:effectRef>
+          <a:fontRef idx="minor">
+            <a:schemeClr val="tx1"/>
+          </a:fontRef>
+        </p:style>
+      </p:cxnSp>
+      <p:cxnSp>
+        <p:nvCxnSpPr>
+          <p:cNvPr id="48" name="Соединительная линия уступом 47"/>
+          <p:cNvCxnSpPr/>
+          <p:nvPr/>
+        </p:nvCxnSpPr>
+        <p:spPr>
+          <a:xfrm rot="10800000" flipV="1">
+            <a:off x="4678879" y="3016331"/>
+            <a:ext cx="1959429" cy="914400"/>
+          </a:xfrm>
+          <a:prstGeom prst="bentConnector3">
+            <a:avLst>
+              <a:gd name="adj1" fmla="val 31212"/>
+            </a:avLst>
+          </a:prstGeom>
+          <a:ln>
+            <a:tailEnd type="triangle"/>
+          </a:ln>
+        </p:spPr>
+        <p:style>
+          <a:lnRef idx="1">
+            <a:schemeClr val="accent1"/>
+          </a:lnRef>
+          <a:fillRef idx="0">
+            <a:schemeClr val="accent1"/>
+          </a:fillRef>
+          <a:effectRef idx="0">
+            <a:schemeClr val="accent1"/>
+          </a:effectRef>
+          <a:fontRef idx="minor">
+            <a:schemeClr val="tx1"/>
+          </a:fontRef>
+        </p:style>
+      </p:cxnSp>
+      <p:cxnSp>
+        <p:nvCxnSpPr>
+          <p:cNvPr id="51" name="Соединительная линия уступом 50"/>
+          <p:cNvCxnSpPr/>
+          <p:nvPr/>
+        </p:nvCxnSpPr>
+        <p:spPr>
+          <a:xfrm rot="16200000" flipV="1">
+            <a:off x="993621" y="5497995"/>
+            <a:ext cx="693222" cy="549624"/>
+          </a:xfrm>
+          <a:prstGeom prst="bentConnector3">
+            <a:avLst>
+              <a:gd name="adj1" fmla="val 2034"/>
+            </a:avLst>
+          </a:prstGeom>
+          <a:ln>
+            <a:tailEnd type="triangle"/>
+          </a:ln>
+        </p:spPr>
+        <p:style>
+          <a:lnRef idx="1">
+            <a:schemeClr val="accent1"/>
+          </a:lnRef>
+          <a:fillRef idx="0">
+            <a:schemeClr val="accent1"/>
+          </a:fillRef>
+          <a:effectRef idx="0">
+            <a:schemeClr val="accent1"/>
+          </a:effectRef>
+          <a:fontRef idx="minor">
+            <a:schemeClr val="tx1"/>
+          </a:fontRef>
+        </p:style>
+      </p:cxnSp>
+      <p:sp>
+        <p:nvSpPr>
+          <p:cNvPr id="57" name="TextBox 56"/>
+          <p:cNvSpPr txBox="1"/>
+          <p:nvPr/>
+        </p:nvSpPr>
+        <p:spPr>
+          <a:xfrm>
+            <a:off x="6221276" y="2652936"/>
+            <a:ext cx="274434" cy="369332"/>
+          </a:xfrm>
+          <a:prstGeom prst="rect">
+            <a:avLst/>
+          </a:prstGeom>
+          <a:noFill/>
+        </p:spPr>
+        <p:txBody>
+          <a:bodyPr wrap="none" rtlCol="0">
+            <a:spAutoFit/>
+          </a:bodyPr>
+          <a:lstStyle/>
+          <a:p>
+            <a:r>
+              <a:rPr lang="en-US" dirty="0">
+                <a:solidFill>
+                  <a:srgbClr val="00FFFF"/>
+                </a:solidFill>
+                <a:latin typeface="Orbitron" panose="02000000000000000000" pitchFamily="2" charset="0"/>
+              </a:rPr>
+              <a:t>1</a:t>
+            </a:r>
+            <a:endParaRPr lang="ru-RU" dirty="0">
+              <a:solidFill>
+                <a:srgbClr val="00FFFF"/>
+              </a:solidFill>
+            </a:endParaRPr>
+          </a:p>
+        </p:txBody>
+      </p:sp>
+      <p:sp>
+        <p:nvSpPr>
+          <p:cNvPr id="58" name="TextBox 57"/>
+          <p:cNvSpPr txBox="1"/>
+          <p:nvPr/>
+        </p:nvSpPr>
+        <p:spPr>
+          <a:xfrm>
+            <a:off x="626682" y="1574654"/>
+            <a:ext cx="377026" cy="369332"/>
+          </a:xfrm>
+          <a:prstGeom prst="rect">
+            <a:avLst/>
+          </a:prstGeom>
+          <a:noFill/>
+        </p:spPr>
+        <p:txBody>
+          <a:bodyPr wrap="none" rtlCol="0">
+            <a:spAutoFit/>
+          </a:bodyPr>
+          <a:lstStyle/>
+          <a:p>
+            <a:r>
+              <a:rPr lang="en-US" dirty="0">
+                <a:solidFill>
+                  <a:srgbClr val="00FFFF"/>
+                </a:solidFill>
+                <a:latin typeface="Orbitron" panose="02000000000000000000" pitchFamily="2" charset="0"/>
+              </a:rPr>
+              <a:t>2</a:t>
+            </a:r>
+            <a:endParaRPr lang="ru-RU" dirty="0">
+              <a:solidFill>
+                <a:srgbClr val="00FFFF"/>
+              </a:solidFill>
+            </a:endParaRPr>
+          </a:p>
+        </p:txBody>
+      </p:sp>
+      <p:sp>
+        <p:nvSpPr>
+          <p:cNvPr id="59" name="TextBox 58"/>
+          <p:cNvSpPr txBox="1"/>
+          <p:nvPr/>
+        </p:nvSpPr>
+        <p:spPr>
+          <a:xfrm>
+            <a:off x="1152520" y="5792392"/>
+            <a:ext cx="375424" cy="369332"/>
+          </a:xfrm>
+          <a:prstGeom prst="rect">
+            <a:avLst/>
+          </a:prstGeom>
+          <a:noFill/>
+        </p:spPr>
+        <p:txBody>
+          <a:bodyPr wrap="none" rtlCol="0">
+            <a:spAutoFit/>
+          </a:bodyPr>
+          <a:lstStyle/>
+          <a:p>
+            <a:r>
+              <a:rPr lang="en-US" dirty="0">
+                <a:solidFill>
+                  <a:srgbClr val="00FFFF"/>
+                </a:solidFill>
+                <a:latin typeface="Orbitron" panose="02000000000000000000" pitchFamily="2" charset="0"/>
+              </a:rPr>
+              <a:t>3</a:t>
+            </a:r>
+            <a:endParaRPr lang="ru-RU" dirty="0">
+              <a:solidFill>
+                <a:srgbClr val="00FFFF"/>
+              </a:solidFill>
+            </a:endParaRPr>
+          </a:p>
+        </p:txBody>
+      </p:sp>
+      <p:sp>
+        <p:nvSpPr>
+          <p:cNvPr id="60" name="TextBox 59"/>
+          <p:cNvSpPr txBox="1"/>
+          <p:nvPr/>
+        </p:nvSpPr>
+        <p:spPr>
+          <a:xfrm>
+            <a:off x="6221276" y="4127433"/>
+            <a:ext cx="352982" cy="369332"/>
+          </a:xfrm>
+          <a:prstGeom prst="rect">
+            <a:avLst/>
+          </a:prstGeom>
+          <a:noFill/>
+        </p:spPr>
+        <p:txBody>
+          <a:bodyPr wrap="none" rtlCol="0">
+            <a:spAutoFit/>
+          </a:bodyPr>
+          <a:lstStyle/>
+          <a:p>
+            <a:r>
+              <a:rPr lang="en-US" dirty="0" smtClean="0">
+                <a:solidFill>
+                  <a:srgbClr val="00FFFF"/>
+                </a:solidFill>
+                <a:latin typeface="Orbitron" panose="02000000000000000000" pitchFamily="2" charset="0"/>
+              </a:rPr>
+              <a:t>4</a:t>
+            </a:r>
+            <a:endParaRPr lang="ru-RU" dirty="0">
+              <a:solidFill>
+                <a:srgbClr val="00FFFF"/>
+              </a:solidFill>
+            </a:endParaRPr>
+          </a:p>
+        </p:txBody>
+      </p:sp>
+    </p:spTree>
+    <p:extLst>
+      <p:ext uri="{BB962C8B-B14F-4D97-AF65-F5344CB8AC3E}">
+        <p14:creationId xmlns:p14="http://schemas.microsoft.com/office/powerpoint/2010/main" val="1208358060"/>
+      </p:ext>
+    </p:extLst>
+  </p:cSld>
+  <p:clrMapOvr>
+    <a:masterClrMapping/>
+  </p:clrMapOvr>
+  <p:transition spd="slow">
+    <p:randomBar/>
+  </p:transition>
+  <p:timing>
+    <p:tnLst>
+      <p:par>
+        <p:cTn id="1" dur="indefinite" restart="never" nodeType="tmRoot"/>
+      </p:par>
+    </p:tnLst>
+  </p:timing>
+</p:sld>
+</file>
+
+<file path=ppt/slides/slide6.xml><?xml version="1.0" encoding="utf-8"?>
+<p:sld xmlns:a="http://schemas.openxmlformats.org/drawingml/2006/main" xmlns:r="http://schemas.openxmlformats.org/officeDocument/2006/relationships" xmlns:p="http://schemas.openxmlformats.org/presentationml/2006/main">
+  <p:cSld>
+    <p:spTree>
+      <p:nvGrpSpPr>
+        <p:cNvPr id="1" name=""/>
+        <p:cNvGrpSpPr/>
+        <p:nvPr/>
+      </p:nvGrpSpPr>
+      <p:grpSpPr>
+        <a:xfrm>
+          <a:off x="0" y="0"/>
+          <a:ext cx="0" cy="0"/>
+          <a:chOff x="0" y="0"/>
+          <a:chExt cx="0" cy="0"/>
+        </a:xfrm>
+      </p:grpSpPr>
+      <p:sp>
+        <p:nvSpPr>
+          <p:cNvPr id="4" name="Заголовок 3"/>
+          <p:cNvSpPr>
+            <a:spLocks noGrp="1"/>
+          </p:cNvSpPr>
+          <p:nvPr>
+            <p:ph type="title"/>
+          </p:nvPr>
+        </p:nvSpPr>
+        <p:spPr>
+          <a:xfrm>
+            <a:off x="614156" y="112816"/>
+            <a:ext cx="3932237" cy="1050966"/>
+          </a:xfrm>
+        </p:spPr>
+        <p:txBody>
+          <a:bodyPr/>
+          <a:lstStyle/>
+          <a:p>
+            <a:pPr algn="ctr"/>
+            <a:r>
+              <a:rPr lang="en-US" b="1" spc="50" dirty="0" smtClean="0">
+                <a:ln w="0"/>
+                <a:solidFill>
+                  <a:srgbClr val="00FFFF"/>
+                </a:solidFill>
+                <a:effectLst>
+                  <a:innerShdw blurRad="63500" dist="50800" dir="13500000">
+                    <a:srgbClr val="000000">
+                      <a:alpha val="50000"/>
+                    </a:srgbClr>
+                  </a:innerShdw>
+                </a:effectLst>
+                <a:latin typeface="Orbitron" panose="02000000000000000000" pitchFamily="2" charset="0"/>
+              </a:rPr>
+              <a:t>First level</a:t>
+            </a:r>
+            <a:endParaRPr lang="ru-RU" dirty="0">
+              <a:solidFill>
+                <a:srgbClr val="00FFFF"/>
+              </a:solidFill>
+            </a:endParaRPr>
+          </a:p>
+        </p:txBody>
+      </p:sp>
+      <p:sp>
+        <p:nvSpPr>
+          <p:cNvPr id="6" name="Текст 5"/>
+          <p:cNvSpPr>
+            <a:spLocks noGrp="1"/>
+          </p:cNvSpPr>
+          <p:nvPr>
+            <p:ph type="body" sz="half" idx="2"/>
+          </p:nvPr>
+        </p:nvSpPr>
+        <p:spPr>
+          <a:xfrm>
+            <a:off x="780411" y="1373662"/>
+            <a:ext cx="3932237" cy="4129644"/>
+          </a:xfrm>
+        </p:spPr>
+        <p:txBody>
+          <a:bodyPr>
+            <a:normAutofit/>
+          </a:bodyPr>
+          <a:lstStyle/>
+          <a:p>
+            <a:r>
+              <a:rPr lang="ru-RU" dirty="0" smtClean="0">
+                <a:solidFill>
+                  <a:srgbClr val="00FFFF"/>
+                </a:solidFill>
+                <a:latin typeface="Courier New" panose="02070309020205020404" pitchFamily="49" charset="0"/>
+                <a:cs typeface="Courier New" panose="02070309020205020404" pitchFamily="49" charset="0"/>
+              </a:rPr>
+              <a:t>Первый уровень игры представляет собой некое слияние </a:t>
+            </a:r>
+            <a:r>
+              <a:rPr lang="en-US" dirty="0" smtClean="0">
+                <a:solidFill>
+                  <a:srgbClr val="00FFFF"/>
+                </a:solidFill>
+                <a:latin typeface="Orbitron" panose="02000000000000000000" pitchFamily="2" charset="0"/>
+                <a:cs typeface="Courier New" panose="02070309020205020404" pitchFamily="49" charset="0"/>
+              </a:rPr>
+              <a:t>“Geometry Dash”</a:t>
+            </a:r>
+            <a:r>
+              <a:rPr lang="en-US" dirty="0" smtClean="0">
+                <a:solidFill>
+                  <a:srgbClr val="00FFFF"/>
+                </a:solidFill>
+                <a:latin typeface="Courier New" panose="02070309020205020404" pitchFamily="49" charset="0"/>
+                <a:cs typeface="Courier New" panose="02070309020205020404" pitchFamily="49" charset="0"/>
+              </a:rPr>
+              <a:t> </a:t>
+            </a:r>
+            <a:r>
+              <a:rPr lang="ru-RU" dirty="0" smtClean="0">
+                <a:solidFill>
+                  <a:srgbClr val="00FFFF"/>
+                </a:solidFill>
+                <a:latin typeface="Courier New" panose="02070309020205020404" pitchFamily="49" charset="0"/>
+                <a:cs typeface="Courier New" panose="02070309020205020404" pitchFamily="49" charset="0"/>
+              </a:rPr>
+              <a:t>и </a:t>
+            </a:r>
+            <a:r>
+              <a:rPr lang="en-US" dirty="0" smtClean="0">
+                <a:solidFill>
+                  <a:srgbClr val="00FFFF"/>
+                </a:solidFill>
+                <a:latin typeface="Orbitron" panose="02000000000000000000" pitchFamily="2" charset="0"/>
+                <a:cs typeface="Courier New" panose="02070309020205020404" pitchFamily="49" charset="0"/>
+              </a:rPr>
+              <a:t>“Flappy bird”</a:t>
+            </a:r>
+            <a:r>
+              <a:rPr lang="en-US" dirty="0" smtClean="0">
+                <a:solidFill>
+                  <a:srgbClr val="00FFFF"/>
+                </a:solidFill>
+                <a:latin typeface="Courier New" panose="02070309020205020404" pitchFamily="49" charset="0"/>
+                <a:cs typeface="Courier New" panose="02070309020205020404" pitchFamily="49" charset="0"/>
+              </a:rPr>
+              <a:t>. </a:t>
+            </a:r>
+            <a:r>
+              <a:rPr lang="ru-RU" dirty="0" smtClean="0">
+                <a:solidFill>
+                  <a:srgbClr val="00FFFF"/>
+                </a:solidFill>
+                <a:latin typeface="Courier New" panose="02070309020205020404" pitchFamily="49" charset="0"/>
+                <a:cs typeface="Courier New" panose="02070309020205020404" pitchFamily="49" charset="0"/>
+              </a:rPr>
+              <a:t>Столкновение с любым объектом, кроме </a:t>
+            </a:r>
+            <a:r>
+              <a:rPr lang="en-US" dirty="0" smtClean="0">
+                <a:solidFill>
+                  <a:srgbClr val="00FFFF"/>
+                </a:solidFill>
+                <a:latin typeface="Courier New" panose="02070309020205020404" pitchFamily="49" charset="0"/>
+                <a:cs typeface="Courier New" panose="02070309020205020404" pitchFamily="49" charset="0"/>
+              </a:rPr>
+              <a:t>“</a:t>
+            </a:r>
+            <a:r>
+              <a:rPr lang="ru-RU" dirty="0" smtClean="0">
+                <a:solidFill>
+                  <a:srgbClr val="00FFFF"/>
+                </a:solidFill>
+                <a:latin typeface="Courier New" panose="02070309020205020404" pitchFamily="49" charset="0"/>
+                <a:cs typeface="Courier New" panose="02070309020205020404" pitchFamily="49" charset="0"/>
+              </a:rPr>
+              <a:t>дверей</a:t>
+            </a:r>
+            <a:r>
+              <a:rPr lang="en-US" dirty="0" smtClean="0">
+                <a:solidFill>
+                  <a:srgbClr val="00FFFF"/>
+                </a:solidFill>
+                <a:latin typeface="Courier New" panose="02070309020205020404" pitchFamily="49" charset="0"/>
+                <a:cs typeface="Courier New" panose="02070309020205020404" pitchFamily="49" charset="0"/>
+              </a:rPr>
+              <a:t>”</a:t>
+            </a:r>
+            <a:r>
+              <a:rPr lang="ru-RU" dirty="0" smtClean="0">
+                <a:solidFill>
+                  <a:srgbClr val="00FFFF"/>
+                </a:solidFill>
+                <a:latin typeface="Courier New" panose="02070309020205020404" pitchFamily="49" charset="0"/>
+                <a:cs typeface="Courier New" panose="02070309020205020404" pitchFamily="49" charset="0"/>
+              </a:rPr>
+              <a:t> приводит к мгновенной </a:t>
+            </a:r>
+            <a:r>
+              <a:rPr lang="ru-RU" b="1" dirty="0" smtClean="0">
+                <a:solidFill>
+                  <a:srgbClr val="FF4164"/>
+                </a:solidFill>
+                <a:latin typeface="Courier New" panose="02070309020205020404" pitchFamily="49" charset="0"/>
+                <a:cs typeface="Courier New" panose="02070309020205020404" pitchFamily="49" charset="0"/>
+              </a:rPr>
+              <a:t>смерти</a:t>
+            </a:r>
+            <a:r>
+              <a:rPr lang="ru-RU" dirty="0" smtClean="0">
+                <a:solidFill>
+                  <a:srgbClr val="00FFFF"/>
+                </a:solidFill>
+                <a:latin typeface="Courier New" panose="02070309020205020404" pitchFamily="49" charset="0"/>
+                <a:cs typeface="Courier New" panose="02070309020205020404" pitchFamily="49" charset="0"/>
+              </a:rPr>
+              <a:t>.</a:t>
+            </a:r>
+          </a:p>
+          <a:p>
+            <a:r>
+              <a:rPr lang="ru-RU" dirty="0" smtClean="0">
+                <a:solidFill>
+                  <a:srgbClr val="00FFFF"/>
+                </a:solidFill>
+                <a:latin typeface="Courier New" panose="02070309020205020404" pitchFamily="49" charset="0"/>
+                <a:cs typeface="Courier New" panose="02070309020205020404" pitchFamily="49" charset="0"/>
+              </a:rPr>
+              <a:t>Вышеупомянутые двери влияют на результат прохождения уровня – Чем больше </a:t>
+            </a:r>
+            <a:r>
+              <a:rPr lang="ru-RU" dirty="0" smtClean="0">
+                <a:solidFill>
+                  <a:srgbClr val="00FF00"/>
+                </a:solidFill>
+                <a:latin typeface="Courier New" panose="02070309020205020404" pitchFamily="49" charset="0"/>
+                <a:cs typeface="Courier New" panose="02070309020205020404" pitchFamily="49" charset="0"/>
+              </a:rPr>
+              <a:t>зелёных</a:t>
+            </a:r>
+            <a:r>
+              <a:rPr lang="ru-RU" dirty="0" smtClean="0">
+                <a:solidFill>
+                  <a:srgbClr val="00FFFF"/>
+                </a:solidFill>
+                <a:latin typeface="Courier New" panose="02070309020205020404" pitchFamily="49" charset="0"/>
+                <a:cs typeface="Courier New" panose="02070309020205020404" pitchFamily="49" charset="0"/>
+              </a:rPr>
+              <a:t> и чем меньше </a:t>
+            </a:r>
+            <a:r>
+              <a:rPr lang="ru-RU" dirty="0" smtClean="0">
+                <a:solidFill>
+                  <a:srgbClr val="FF0000"/>
+                </a:solidFill>
+                <a:latin typeface="Courier New" panose="02070309020205020404" pitchFamily="49" charset="0"/>
+                <a:cs typeface="Courier New" panose="02070309020205020404" pitchFamily="49" charset="0"/>
+              </a:rPr>
+              <a:t>красных</a:t>
+            </a:r>
+            <a:r>
+              <a:rPr lang="ru-RU" dirty="0" smtClean="0">
+                <a:solidFill>
+                  <a:srgbClr val="00FFFF"/>
+                </a:solidFill>
+                <a:latin typeface="Courier New" panose="02070309020205020404" pitchFamily="49" charset="0"/>
+                <a:cs typeface="Courier New" panose="02070309020205020404" pitchFamily="49" charset="0"/>
+              </a:rPr>
+              <a:t> дверей пройдено, тем лучше счёт.</a:t>
+            </a:r>
+            <a:br>
+              <a:rPr lang="ru-RU" dirty="0" smtClean="0">
+                <a:solidFill>
+                  <a:srgbClr val="00FFFF"/>
+                </a:solidFill>
+                <a:latin typeface="Courier New" panose="02070309020205020404" pitchFamily="49" charset="0"/>
+                <a:cs typeface="Courier New" panose="02070309020205020404" pitchFamily="49" charset="0"/>
+              </a:rPr>
+            </a:br>
+            <a:r>
+              <a:rPr lang="ru-RU" dirty="0" smtClean="0">
+                <a:solidFill>
+                  <a:srgbClr val="00FFFF"/>
+                </a:solidFill>
+                <a:latin typeface="Courier New" panose="02070309020205020404" pitchFamily="49" charset="0"/>
+                <a:cs typeface="Courier New" panose="02070309020205020404" pitchFamily="49" charset="0"/>
+              </a:rPr>
+              <a:t/>
+            </a:r>
+            <a:br>
+              <a:rPr lang="ru-RU" dirty="0" smtClean="0">
+                <a:solidFill>
+                  <a:srgbClr val="00FFFF"/>
+                </a:solidFill>
+                <a:latin typeface="Courier New" panose="02070309020205020404" pitchFamily="49" charset="0"/>
+                <a:cs typeface="Courier New" panose="02070309020205020404" pitchFamily="49" charset="0"/>
+              </a:rPr>
+            </a:br>
+            <a:r>
+              <a:rPr lang="ru-RU" dirty="0" smtClean="0">
+                <a:solidFill>
+                  <a:srgbClr val="00FFFF"/>
+                </a:solidFill>
+                <a:latin typeface="Courier New" panose="02070309020205020404" pitchFamily="49" charset="0"/>
+                <a:cs typeface="Courier New" panose="02070309020205020404" pitchFamily="49" charset="0"/>
+              </a:rPr>
+              <a:t>Результат уровня влияет на атаки и здоровье финального босса. По факту, вы сами определяете себе сложность прохождения</a:t>
+            </a:r>
+            <a:endParaRPr lang="ru-RU" dirty="0">
+              <a:solidFill>
+                <a:srgbClr val="00FFFF"/>
+              </a:solidFill>
+              <a:latin typeface="Courier New" panose="02070309020205020404" pitchFamily="49" charset="0"/>
+              <a:cs typeface="Courier New" panose="02070309020205020404" pitchFamily="49" charset="0"/>
+            </a:endParaRPr>
+          </a:p>
+        </p:txBody>
+      </p:sp>
+      <p:sp>
+        <p:nvSpPr>
+          <p:cNvPr id="8" name="Объект 7"/>
+          <p:cNvSpPr>
+            <a:spLocks noGrp="1"/>
+          </p:cNvSpPr>
+          <p:nvPr>
+            <p:ph idx="1"/>
+          </p:nvPr>
+        </p:nvSpPr>
+        <p:spPr>
+          <a:xfrm>
+            <a:off x="780411" y="5713184"/>
+            <a:ext cx="11094914" cy="678711"/>
+          </a:xfrm>
+        </p:spPr>
+        <p:txBody>
+          <a:bodyPr>
+            <a:normAutofit/>
+          </a:bodyPr>
+          <a:lstStyle/>
+          <a:p>
+            <a:pPr marL="0" indent="0">
+              <a:buNone/>
+            </a:pPr>
+            <a:r>
+              <a:rPr lang="ru-RU" sz="1600" dirty="0" smtClean="0">
+                <a:solidFill>
+                  <a:srgbClr val="00FFFF"/>
+                </a:solidFill>
+                <a:latin typeface="Courier New" panose="02070309020205020404" pitchFamily="49" charset="0"/>
+                <a:cs typeface="Courier New" panose="02070309020205020404" pitchFamily="49" charset="0"/>
+              </a:rPr>
+              <a:t>Этот уровень можно считать пробой пера – здесь тестировалась камера, обработка нажатия клавиш, механика столкновений, движения и смерти. Всё самое интересное только начинается!</a:t>
+            </a:r>
+            <a:endParaRPr lang="ru-RU" sz="1600" dirty="0">
+              <a:solidFill>
+                <a:srgbClr val="00FFFF"/>
+              </a:solidFill>
+              <a:latin typeface="Courier New" panose="02070309020205020404" pitchFamily="49" charset="0"/>
+              <a:cs typeface="Courier New" panose="02070309020205020404" pitchFamily="49" charset="0"/>
+            </a:endParaRPr>
+          </a:p>
+        </p:txBody>
+      </p:sp>
+      <p:pic>
+        <p:nvPicPr>
+          <p:cNvPr id="9" name="Объект 6"/>
+          <p:cNvPicPr>
+            <a:picLocks noChangeAspect="1"/>
+          </p:cNvPicPr>
+          <p:nvPr/>
+        </p:nvPicPr>
+        <p:blipFill>
+          <a:blip r:embed="rId2"/>
+          <a:stretch>
+            <a:fillRect/>
+          </a:stretch>
+        </p:blipFill>
+        <p:spPr>
+          <a:xfrm>
+            <a:off x="5703125" y="884945"/>
+            <a:ext cx="6172200" cy="4618359"/>
+          </a:xfrm>
+          <a:prstGeom prst="rect">
+            <a:avLst/>
+          </a:prstGeom>
+        </p:spPr>
+      </p:pic>
+    </p:spTree>
+    <p:extLst>
+      <p:ext uri="{BB962C8B-B14F-4D97-AF65-F5344CB8AC3E}">
+        <p14:creationId xmlns:p14="http://schemas.microsoft.com/office/powerpoint/2010/main" val="2768077436"/>
+      </p:ext>
+    </p:extLst>
+  </p:cSld>
+  <p:clrMapOvr>
+    <a:masterClrMapping/>
+  </p:clrMapOvr>
+  <p:transition spd="slow">
+    <p:randomBar/>
+  </p:transition>
+  <p:timing>
+    <p:tnLst>
+      <p:par>
+        <p:cTn id="1" dur="indefinite" restart="never" nodeType="tmRoot"/>
+      </p:par>
+    </p:tnLst>
+  </p:timing>
+</p:sld>
+</file>
+
+<file path=ppt/slides/slide7.xml><?xml version="1.0" encoding="utf-8"?>
+<p:sld xmlns:a="http://schemas.openxmlformats.org/drawingml/2006/main" xmlns:r="http://schemas.openxmlformats.org/officeDocument/2006/relationships" xmlns:p="http://schemas.openxmlformats.org/presentationml/2006/main">
+  <p:cSld>
+    <p:spTree>
+      <p:nvGrpSpPr>
+        <p:cNvPr id="1" name=""/>
+        <p:cNvGrpSpPr/>
+        <p:nvPr/>
+      </p:nvGrpSpPr>
+      <p:grpSpPr>
+        <a:xfrm>
+          <a:off x="0" y="0"/>
+          <a:ext cx="0" cy="0"/>
+          <a:chOff x="0" y="0"/>
+          <a:chExt cx="0" cy="0"/>
+        </a:xfrm>
+      </p:grpSpPr>
+      <p:sp>
+        <p:nvSpPr>
+          <p:cNvPr id="2" name="Заголовок 1"/>
+          <p:cNvSpPr>
+            <a:spLocks noGrp="1"/>
+          </p:cNvSpPr>
+          <p:nvPr>
+            <p:ph type="title"/>
+          </p:nvPr>
+        </p:nvSpPr>
+        <p:spPr>
+          <a:xfrm>
+            <a:off x="5223638" y="42760"/>
+            <a:ext cx="6722938" cy="944088"/>
+          </a:xfrm>
+        </p:spPr>
+        <p:txBody>
+          <a:bodyPr>
+            <a:normAutofit/>
+          </a:bodyPr>
+          <a:lstStyle/>
+          <a:p>
+            <a:pPr algn="ctr"/>
+            <a:r>
+              <a:rPr lang="en-US" sz="3600" b="1" spc="50" dirty="0" smtClean="0">
+                <a:ln w="0"/>
+                <a:solidFill>
+                  <a:srgbClr val="00FFFF"/>
+                </a:solidFill>
+                <a:effectLst>
+                  <a:innerShdw blurRad="63500" dist="50800" dir="13500000">
+                    <a:srgbClr val="000000">
+                      <a:alpha val="50000"/>
+                    </a:srgbClr>
+                  </a:innerShdw>
+                </a:effectLst>
+                <a:latin typeface="Orbitron" panose="02000000000000000000" pitchFamily="2" charset="0"/>
+              </a:rPr>
+              <a:t>Second </a:t>
+            </a:r>
+            <a:r>
+              <a:rPr lang="en-US" sz="3600" b="1" spc="50" dirty="0">
+                <a:ln w="0"/>
+                <a:solidFill>
+                  <a:srgbClr val="00FFFF"/>
+                </a:solidFill>
+                <a:effectLst>
+                  <a:innerShdw blurRad="63500" dist="50800" dir="13500000">
+                    <a:srgbClr val="000000">
+                      <a:alpha val="50000"/>
+                    </a:srgbClr>
+                  </a:innerShdw>
+                </a:effectLst>
+                <a:latin typeface="Orbitron" panose="02000000000000000000" pitchFamily="2" charset="0"/>
+              </a:rPr>
+              <a:t>level</a:t>
+            </a:r>
+            <a:endParaRPr lang="ru-RU" sz="3600" dirty="0"/>
+          </a:p>
+        </p:txBody>
+      </p:sp>
+      <p:sp>
+        <p:nvSpPr>
+          <p:cNvPr id="3" name="Объект 2"/>
+          <p:cNvSpPr>
+            <a:spLocks noGrp="1"/>
+          </p:cNvSpPr>
+          <p:nvPr>
+            <p:ph idx="1"/>
+          </p:nvPr>
+        </p:nvSpPr>
+        <p:spPr>
+          <a:xfrm>
+            <a:off x="8587715" y="986848"/>
+            <a:ext cx="3358861" cy="5134799"/>
+          </a:xfrm>
+        </p:spPr>
+        <p:txBody>
+          <a:bodyPr>
+            <a:normAutofit/>
+          </a:bodyPr>
+          <a:lstStyle/>
+          <a:p>
+            <a:pPr marL="0" indent="0">
+              <a:buNone/>
+            </a:pPr>
+            <a:r>
+              <a:rPr lang="en-US" sz="1600" dirty="0" smtClean="0">
+                <a:solidFill>
+                  <a:srgbClr val="00FFFF"/>
+                </a:solidFill>
+                <a:latin typeface="Courier New" panose="02070309020205020404" pitchFamily="49" charset="0"/>
+                <a:cs typeface="Courier New" panose="02070309020205020404" pitchFamily="49" charset="0"/>
+              </a:rPr>
+              <a:t>“</a:t>
+            </a:r>
+            <a:r>
+              <a:rPr lang="ru-RU" sz="1600" dirty="0" smtClean="0">
+                <a:solidFill>
+                  <a:srgbClr val="00FFFF"/>
+                </a:solidFill>
+                <a:latin typeface="Courier New" panose="02070309020205020404" pitchFamily="49" charset="0"/>
+                <a:cs typeface="Courier New" panose="02070309020205020404" pitchFamily="49" charset="0"/>
+              </a:rPr>
+              <a:t>под старину</a:t>
+            </a:r>
+            <a:r>
+              <a:rPr lang="en-US" sz="1600" dirty="0" smtClean="0">
+                <a:solidFill>
+                  <a:srgbClr val="00FFFF"/>
+                </a:solidFill>
+                <a:latin typeface="Courier New" panose="02070309020205020404" pitchFamily="49" charset="0"/>
+                <a:cs typeface="Courier New" panose="02070309020205020404" pitchFamily="49" charset="0"/>
+              </a:rPr>
+              <a:t>”</a:t>
+            </a:r>
+            <a:r>
+              <a:rPr lang="ru-RU" sz="1600" dirty="0" smtClean="0">
+                <a:solidFill>
+                  <a:srgbClr val="00FFFF"/>
+                </a:solidFill>
+                <a:latin typeface="Courier New" panose="02070309020205020404" pitchFamily="49" charset="0"/>
+                <a:cs typeface="Courier New" panose="02070309020205020404" pitchFamily="49" charset="0"/>
+              </a:rPr>
+              <a:t> – игра </a:t>
+            </a:r>
+            <a:r>
+              <a:rPr lang="ru-RU" sz="1600" dirty="0" smtClean="0">
+                <a:solidFill>
+                  <a:srgbClr val="FF0000"/>
+                </a:solidFill>
+                <a:latin typeface="Courier New" panose="02070309020205020404" pitchFamily="49" charset="0"/>
+                <a:cs typeface="Courier New" panose="02070309020205020404" pitchFamily="49" charset="0"/>
+              </a:rPr>
+              <a:t>не прощает</a:t>
+            </a:r>
+            <a:r>
+              <a:rPr lang="ru-RU" sz="1600" dirty="0" smtClean="0">
+                <a:solidFill>
+                  <a:srgbClr val="00FFFF"/>
+                </a:solidFill>
+                <a:latin typeface="Courier New" panose="02070309020205020404" pitchFamily="49" charset="0"/>
+                <a:cs typeface="Courier New" panose="02070309020205020404" pitchFamily="49" charset="0"/>
+              </a:rPr>
+              <a:t> ошибок, </a:t>
+            </a:r>
+            <a:r>
+              <a:rPr lang="en-US" sz="1600" dirty="0" smtClean="0">
+                <a:solidFill>
+                  <a:srgbClr val="00FFFF"/>
+                </a:solidFill>
+                <a:latin typeface="Courier New" panose="02070309020205020404" pitchFamily="49" charset="0"/>
+                <a:cs typeface="Courier New" panose="02070309020205020404" pitchFamily="49" charset="0"/>
+              </a:rPr>
+              <a:t>“</a:t>
+            </a:r>
+            <a:r>
+              <a:rPr lang="ru-RU" sz="1600" dirty="0" smtClean="0">
+                <a:solidFill>
+                  <a:srgbClr val="00FFFF"/>
+                </a:solidFill>
+                <a:latin typeface="Courier New" panose="02070309020205020404" pitchFamily="49" charset="0"/>
+                <a:cs typeface="Courier New" panose="02070309020205020404" pitchFamily="49" charset="0"/>
+              </a:rPr>
+              <a:t>времени койота</a:t>
+            </a:r>
+            <a:r>
+              <a:rPr lang="en-US" sz="1600" dirty="0" smtClean="0">
+                <a:solidFill>
+                  <a:srgbClr val="00FFFF"/>
+                </a:solidFill>
+                <a:latin typeface="Courier New" panose="02070309020205020404" pitchFamily="49" charset="0"/>
+                <a:cs typeface="Courier New" panose="02070309020205020404" pitchFamily="49" charset="0"/>
+              </a:rPr>
+              <a:t>”</a:t>
+            </a:r>
+            <a:r>
+              <a:rPr lang="ru-RU" sz="1600" dirty="0" smtClean="0">
+                <a:solidFill>
+                  <a:srgbClr val="00FFFF"/>
+                </a:solidFill>
+                <a:latin typeface="Courier New" panose="02070309020205020404" pitchFamily="49" charset="0"/>
+                <a:cs typeface="Courier New" panose="02070309020205020404" pitchFamily="49" charset="0"/>
+              </a:rPr>
+              <a:t>* в ней не предусмотрено, а любая смерть заставляет начать уровень с начала.</a:t>
+            </a:r>
+          </a:p>
+          <a:p>
+            <a:pPr marL="0" indent="0">
+              <a:buNone/>
+            </a:pPr>
+            <a:r>
+              <a:rPr lang="ru-RU" sz="1600" dirty="0" smtClean="0">
+                <a:solidFill>
+                  <a:srgbClr val="00FFFF"/>
+                </a:solidFill>
+                <a:latin typeface="Courier New" panose="02070309020205020404" pitchFamily="49" charset="0"/>
+                <a:cs typeface="Courier New" panose="02070309020205020404" pitchFamily="49" charset="0"/>
+              </a:rPr>
+              <a:t>Счётчик в правом верхнем углу экрана показывает количество затраченных попыток (изначально </a:t>
+            </a:r>
+            <a:r>
+              <a:rPr lang="en-US" sz="1600" dirty="0" smtClean="0">
+                <a:solidFill>
+                  <a:srgbClr val="00FF00"/>
+                </a:solidFill>
+                <a:latin typeface="Orbitron" panose="02000000000000000000" pitchFamily="2" charset="0"/>
+                <a:cs typeface="Courier New" panose="02070309020205020404" pitchFamily="49" charset="0"/>
+              </a:rPr>
+              <a:t>30</a:t>
+            </a:r>
+            <a:r>
+              <a:rPr lang="ru-RU" sz="1600" dirty="0" smtClean="0">
+                <a:solidFill>
+                  <a:srgbClr val="00FFFF"/>
+                </a:solidFill>
+                <a:latin typeface="Courier New" panose="02070309020205020404" pitchFamily="49" charset="0"/>
+                <a:cs typeface="Courier New" panose="02070309020205020404" pitchFamily="49" charset="0"/>
+              </a:rPr>
+              <a:t>). Чем меньше их затрачено, тем больше очков здоровья будет иметь игрок при битве с боссом.</a:t>
+            </a:r>
+          </a:p>
+          <a:p>
+            <a:pPr marL="0" indent="0">
+              <a:buNone/>
+            </a:pPr>
+            <a:endParaRPr lang="ru-RU" sz="1600" dirty="0">
+              <a:solidFill>
+                <a:srgbClr val="00FFFF"/>
+              </a:solidFill>
+              <a:latin typeface="Courier New" panose="02070309020205020404" pitchFamily="49" charset="0"/>
+              <a:cs typeface="Courier New" panose="02070309020205020404" pitchFamily="49" charset="0"/>
+            </a:endParaRPr>
+          </a:p>
+          <a:p>
+            <a:pPr marL="0" indent="0">
+              <a:buNone/>
+            </a:pPr>
+            <a:endParaRPr lang="ru-RU" sz="1600" dirty="0" smtClean="0">
+              <a:solidFill>
+                <a:srgbClr val="00FFFF"/>
+              </a:solidFill>
+              <a:latin typeface="Courier New" panose="02070309020205020404" pitchFamily="49" charset="0"/>
+              <a:cs typeface="Courier New" panose="02070309020205020404" pitchFamily="49" charset="0"/>
+            </a:endParaRPr>
+          </a:p>
+          <a:p>
+            <a:pPr marL="0" indent="0">
+              <a:buNone/>
+            </a:pPr>
+            <a:r>
+              <a:rPr lang="ru-RU" sz="1400" dirty="0" smtClean="0">
+                <a:solidFill>
+                  <a:srgbClr val="00FFFF"/>
+                </a:solidFill>
+                <a:latin typeface="Courier New" panose="02070309020205020404" pitchFamily="49" charset="0"/>
+                <a:cs typeface="Courier New" panose="02070309020205020404" pitchFamily="49" charset="0"/>
+              </a:rPr>
+              <a:t>* Время койота – щадящая механика в платформерах, позволяющая выполнить действие чуть раньше или чуть позже, чем необходимо</a:t>
+            </a:r>
+            <a:endParaRPr lang="ru-RU" sz="1400" dirty="0">
+              <a:solidFill>
+                <a:srgbClr val="00FFFF"/>
+              </a:solidFill>
+              <a:latin typeface="Courier New" panose="02070309020205020404" pitchFamily="49" charset="0"/>
+              <a:cs typeface="Courier New" panose="02070309020205020404" pitchFamily="49" charset="0"/>
+            </a:endParaRPr>
+          </a:p>
+        </p:txBody>
+      </p:sp>
+      <p:sp>
+        <p:nvSpPr>
+          <p:cNvPr id="4" name="Текст 3"/>
+          <p:cNvSpPr>
+            <a:spLocks noGrp="1"/>
+          </p:cNvSpPr>
+          <p:nvPr>
+            <p:ph type="body" sz="half" idx="2"/>
+          </p:nvPr>
+        </p:nvSpPr>
+        <p:spPr>
+          <a:xfrm>
+            <a:off x="5223638" y="986848"/>
+            <a:ext cx="3364077" cy="5134799"/>
+          </a:xfrm>
+        </p:spPr>
+        <p:txBody>
+          <a:bodyPr>
+            <a:normAutofit/>
+          </a:bodyPr>
+          <a:lstStyle/>
+          <a:p>
+            <a:r>
+              <a:rPr lang="ru-RU" dirty="0" smtClean="0">
+                <a:solidFill>
+                  <a:srgbClr val="00FFFF"/>
+                </a:solidFill>
+                <a:latin typeface="Courier New" panose="02070309020205020404" pitchFamily="49" charset="0"/>
+                <a:cs typeface="Courier New" panose="02070309020205020404" pitchFamily="49" charset="0"/>
+              </a:rPr>
+              <a:t>Этот уровень значительно интереснее и разнообразнее, чем первый - были добавлены:</a:t>
+            </a:r>
+          </a:p>
+          <a:p>
+            <a:pPr marL="285750" indent="-285750">
+              <a:buFont typeface="Arial" panose="020B0604020202020204" pitchFamily="34" charset="0"/>
+              <a:buChar char="•"/>
+            </a:pPr>
+            <a:r>
+              <a:rPr lang="ru-RU" dirty="0" smtClean="0">
+                <a:solidFill>
+                  <a:srgbClr val="00FFFF"/>
+                </a:solidFill>
+                <a:latin typeface="Courier New" panose="02070309020205020404" pitchFamily="49" charset="0"/>
+                <a:cs typeface="Courier New" panose="02070309020205020404" pitchFamily="49" charset="0"/>
+              </a:rPr>
+              <a:t>Механика прыжков и физика падения;</a:t>
+            </a:r>
+          </a:p>
+          <a:p>
+            <a:pPr marL="285750" indent="-285750">
+              <a:buFont typeface="Arial" panose="020B0604020202020204" pitchFamily="34" charset="0"/>
+              <a:buChar char="•"/>
+            </a:pPr>
+            <a:r>
+              <a:rPr lang="ru-RU" dirty="0" smtClean="0">
+                <a:solidFill>
+                  <a:srgbClr val="00FFFF"/>
+                </a:solidFill>
+                <a:latin typeface="Courier New" panose="02070309020205020404" pitchFamily="49" charset="0"/>
+                <a:cs typeface="Courier New" panose="02070309020205020404" pitchFamily="49" charset="0"/>
+              </a:rPr>
+              <a:t>Атака персонажа;</a:t>
+            </a:r>
+          </a:p>
+          <a:p>
+            <a:pPr marL="285750" indent="-285750">
+              <a:buFont typeface="Arial" panose="020B0604020202020204" pitchFamily="34" charset="0"/>
+              <a:buChar char="•"/>
+            </a:pPr>
+            <a:r>
+              <a:rPr lang="ru-RU" dirty="0" smtClean="0">
+                <a:solidFill>
+                  <a:srgbClr val="00FFFF"/>
+                </a:solidFill>
+                <a:latin typeface="Courier New" panose="02070309020205020404" pitchFamily="49" charset="0"/>
+                <a:cs typeface="Courier New" panose="02070309020205020404" pitchFamily="49" charset="0"/>
+              </a:rPr>
+              <a:t>Враги, олицетворяющие собой баги;</a:t>
+            </a:r>
+          </a:p>
+          <a:p>
+            <a:pPr marL="285750" indent="-285750">
+              <a:buFont typeface="Arial" panose="020B0604020202020204" pitchFamily="34" charset="0"/>
+              <a:buChar char="•"/>
+            </a:pPr>
+            <a:r>
+              <a:rPr lang="ru-RU" dirty="0" smtClean="0">
+                <a:solidFill>
+                  <a:srgbClr val="00FFFF"/>
+                </a:solidFill>
+                <a:latin typeface="Courier New" panose="02070309020205020404" pitchFamily="49" charset="0"/>
+                <a:cs typeface="Courier New" panose="02070309020205020404" pitchFamily="49" charset="0"/>
+              </a:rPr>
+              <a:t>Бонусы, позволяющие улучшить свой счёт;</a:t>
+            </a:r>
+          </a:p>
+          <a:p>
+            <a:pPr marL="285750" indent="-285750">
+              <a:buFont typeface="Arial" panose="020B0604020202020204" pitchFamily="34" charset="0"/>
+              <a:buChar char="•"/>
+            </a:pPr>
+            <a:r>
+              <a:rPr lang="ru-RU" dirty="0" smtClean="0">
+                <a:solidFill>
+                  <a:srgbClr val="00FFFF"/>
+                </a:solidFill>
+                <a:latin typeface="Courier New" panose="02070309020205020404" pitchFamily="49" charset="0"/>
+                <a:cs typeface="Courier New" panose="02070309020205020404" pitchFamily="49" charset="0"/>
+              </a:rPr>
+              <a:t>Анимированные спрайты</a:t>
+            </a:r>
+            <a:r>
+              <a:rPr lang="en-US" dirty="0" smtClean="0">
+                <a:solidFill>
+                  <a:srgbClr val="00FFFF"/>
+                </a:solidFill>
+                <a:latin typeface="Courier New" panose="02070309020205020404" pitchFamily="49" charset="0"/>
+                <a:cs typeface="Courier New" panose="02070309020205020404" pitchFamily="49" charset="0"/>
+              </a:rPr>
+              <a:t>;</a:t>
+            </a:r>
+            <a:endParaRPr lang="ru-RU" dirty="0" smtClean="0">
+              <a:solidFill>
+                <a:srgbClr val="00FFFF"/>
+              </a:solidFill>
+              <a:latin typeface="Courier New" panose="02070309020205020404" pitchFamily="49" charset="0"/>
+              <a:cs typeface="Courier New" panose="02070309020205020404" pitchFamily="49" charset="0"/>
+            </a:endParaRPr>
+          </a:p>
+          <a:p>
+            <a:pPr marL="285750" indent="-285750">
+              <a:buFont typeface="Arial" panose="020B0604020202020204" pitchFamily="34" charset="0"/>
+              <a:buChar char="•"/>
+            </a:pPr>
+            <a:r>
+              <a:rPr lang="ru-RU" dirty="0" smtClean="0">
+                <a:solidFill>
+                  <a:srgbClr val="00FFFF"/>
+                </a:solidFill>
+                <a:latin typeface="Courier New" panose="02070309020205020404" pitchFamily="49" charset="0"/>
+                <a:cs typeface="Courier New" panose="02070309020205020404" pitchFamily="49" charset="0"/>
+              </a:rPr>
+              <a:t>Эффекты взрыва как вражеских снарядов, так и снарядов игрока.</a:t>
+            </a:r>
+          </a:p>
+          <a:p>
+            <a:r>
+              <a:rPr lang="ru-RU" dirty="0" smtClean="0">
+                <a:solidFill>
+                  <a:srgbClr val="00FFFF"/>
+                </a:solidFill>
+                <a:latin typeface="Courier New" panose="02070309020205020404" pitchFamily="49" charset="0"/>
+                <a:cs typeface="Courier New" panose="02070309020205020404" pitchFamily="49" charset="0"/>
+              </a:rPr>
+              <a:t>Теперь в основе геймплея действительно лежит платформинг, сделанный </a:t>
+            </a:r>
+          </a:p>
+        </p:txBody>
+      </p:sp>
+      <p:pic>
+        <p:nvPicPr>
+          <p:cNvPr id="6" name="Рисунок 5"/>
+          <p:cNvPicPr>
+            <a:picLocks noChangeAspect="1"/>
+          </p:cNvPicPr>
+          <p:nvPr/>
+        </p:nvPicPr>
+        <p:blipFill>
+          <a:blip r:embed="rId2"/>
+          <a:stretch>
+            <a:fillRect/>
+          </a:stretch>
+        </p:blipFill>
+        <p:spPr>
+          <a:xfrm>
+            <a:off x="10838089" y="6121647"/>
+            <a:ext cx="1108487" cy="712599"/>
+          </a:xfrm>
+          <a:prstGeom prst="rect">
+            <a:avLst/>
+          </a:prstGeom>
+        </p:spPr>
+      </p:pic>
+      <p:pic>
+        <p:nvPicPr>
+          <p:cNvPr id="7" name="Рисунок 6"/>
+          <p:cNvPicPr>
+            <a:picLocks noChangeAspect="1"/>
+          </p:cNvPicPr>
+          <p:nvPr/>
+        </p:nvPicPr>
+        <p:blipFill>
+          <a:blip r:embed="rId3"/>
+          <a:stretch>
+            <a:fillRect/>
+          </a:stretch>
+        </p:blipFill>
+        <p:spPr>
+          <a:xfrm>
+            <a:off x="9869880" y="6366336"/>
+            <a:ext cx="509155" cy="257123"/>
+          </a:xfrm>
+          <a:prstGeom prst="rect">
+            <a:avLst/>
+          </a:prstGeom>
+        </p:spPr>
+      </p:pic>
+      <p:pic>
+        <p:nvPicPr>
+          <p:cNvPr id="8" name="Рисунок 7"/>
+          <p:cNvPicPr>
+            <a:picLocks noChangeAspect="1"/>
+          </p:cNvPicPr>
+          <p:nvPr/>
+        </p:nvPicPr>
+        <p:blipFill>
+          <a:blip r:embed="rId3"/>
+          <a:stretch>
+            <a:fillRect/>
+          </a:stretch>
+        </p:blipFill>
+        <p:spPr>
+          <a:xfrm>
+            <a:off x="5963793" y="6349384"/>
+            <a:ext cx="509155" cy="257123"/>
+          </a:xfrm>
+          <a:prstGeom prst="rect">
+            <a:avLst/>
+          </a:prstGeom>
+        </p:spPr>
+      </p:pic>
+      <p:pic>
+        <p:nvPicPr>
+          <p:cNvPr id="9" name="Рисунок 8"/>
+          <p:cNvPicPr>
+            <a:picLocks noChangeAspect="1"/>
+          </p:cNvPicPr>
+          <p:nvPr/>
+        </p:nvPicPr>
+        <p:blipFill>
+          <a:blip r:embed="rId4"/>
+          <a:stretch>
+            <a:fillRect/>
+          </a:stretch>
+        </p:blipFill>
+        <p:spPr>
+          <a:xfrm>
+            <a:off x="129124" y="1378732"/>
+            <a:ext cx="5094514" cy="3765499"/>
+          </a:xfrm>
+          <a:prstGeom prst="rect">
+            <a:avLst/>
+          </a:prstGeom>
+        </p:spPr>
+      </p:pic>
+      <p:pic>
+        <p:nvPicPr>
+          <p:cNvPr id="10" name="Рисунок 9"/>
+          <p:cNvPicPr>
+            <a:picLocks noChangeAspect="1"/>
+          </p:cNvPicPr>
+          <p:nvPr/>
+        </p:nvPicPr>
+        <p:blipFill>
+          <a:blip r:embed="rId5"/>
+          <a:stretch>
+            <a:fillRect/>
+          </a:stretch>
+        </p:blipFill>
+        <p:spPr>
+          <a:xfrm>
+            <a:off x="1300578" y="6222742"/>
+            <a:ext cx="596148" cy="544309"/>
+          </a:xfrm>
+          <a:prstGeom prst="rect">
+            <a:avLst/>
+          </a:prstGeom>
+        </p:spPr>
+      </p:pic>
+      <p:pic>
+        <p:nvPicPr>
+          <p:cNvPr id="11" name="Рисунок 10"/>
+          <p:cNvPicPr>
+            <a:picLocks noChangeAspect="1"/>
+          </p:cNvPicPr>
+          <p:nvPr/>
+        </p:nvPicPr>
+        <p:blipFill>
+          <a:blip r:embed="rId6"/>
+          <a:stretch>
+            <a:fillRect/>
+          </a:stretch>
+        </p:blipFill>
+        <p:spPr>
+          <a:xfrm>
+            <a:off x="810094" y="6347686"/>
+            <a:ext cx="490484" cy="486560"/>
+          </a:xfrm>
+          <a:prstGeom prst="rect">
+            <a:avLst/>
+          </a:prstGeom>
+        </p:spPr>
+      </p:pic>
+      <p:pic>
+        <p:nvPicPr>
+          <p:cNvPr id="12" name="Рисунок 11"/>
+          <p:cNvPicPr>
+            <a:picLocks noChangeAspect="1"/>
+          </p:cNvPicPr>
+          <p:nvPr/>
+        </p:nvPicPr>
+        <p:blipFill>
+          <a:blip r:embed="rId6"/>
+          <a:stretch>
+            <a:fillRect/>
+          </a:stretch>
+        </p:blipFill>
+        <p:spPr>
+          <a:xfrm>
+            <a:off x="810094" y="5861126"/>
+            <a:ext cx="490484" cy="486560"/>
+          </a:xfrm>
+          <a:prstGeom prst="rect">
+            <a:avLst/>
+          </a:prstGeom>
+        </p:spPr>
+      </p:pic>
+      <p:pic>
+        <p:nvPicPr>
+          <p:cNvPr id="13" name="Рисунок 12"/>
+          <p:cNvPicPr>
+            <a:picLocks noChangeAspect="1"/>
+          </p:cNvPicPr>
+          <p:nvPr/>
+        </p:nvPicPr>
+        <p:blipFill>
+          <a:blip r:embed="rId6"/>
+          <a:stretch>
+            <a:fillRect/>
+          </a:stretch>
+        </p:blipFill>
+        <p:spPr>
+          <a:xfrm>
+            <a:off x="810094" y="5374566"/>
+            <a:ext cx="490484" cy="486560"/>
+          </a:xfrm>
+          <a:prstGeom prst="rect">
+            <a:avLst/>
+          </a:prstGeom>
+        </p:spPr>
+      </p:pic>
+      <p:pic>
+        <p:nvPicPr>
+          <p:cNvPr id="14" name="Рисунок 13"/>
+          <p:cNvPicPr>
+            <a:picLocks noChangeAspect="1"/>
+          </p:cNvPicPr>
+          <p:nvPr/>
+        </p:nvPicPr>
+        <p:blipFill>
+          <a:blip r:embed="rId6"/>
+          <a:stretch>
+            <a:fillRect/>
+          </a:stretch>
+        </p:blipFill>
+        <p:spPr>
+          <a:xfrm>
+            <a:off x="319610" y="5374566"/>
+            <a:ext cx="490484" cy="486560"/>
+          </a:xfrm>
+          <a:prstGeom prst="rect">
+            <a:avLst/>
+          </a:prstGeom>
+        </p:spPr>
+      </p:pic>
+      <p:pic>
+        <p:nvPicPr>
+          <p:cNvPr id="15" name="Рисунок 14"/>
+          <p:cNvPicPr>
+            <a:picLocks noChangeAspect="1"/>
+          </p:cNvPicPr>
+          <p:nvPr/>
+        </p:nvPicPr>
+        <p:blipFill>
+          <a:blip r:embed="rId7"/>
+          <a:stretch>
+            <a:fillRect/>
+          </a:stretch>
+        </p:blipFill>
+        <p:spPr>
+          <a:xfrm>
+            <a:off x="-165594" y="5374566"/>
+            <a:ext cx="485204" cy="485204"/>
+          </a:xfrm>
+          <a:prstGeom prst="rect">
+            <a:avLst/>
+          </a:prstGeom>
+        </p:spPr>
+      </p:pic>
+      <p:pic>
+        <p:nvPicPr>
+          <p:cNvPr id="16" name="Рисунок 15"/>
+          <p:cNvPicPr>
+            <a:picLocks noChangeAspect="1"/>
+          </p:cNvPicPr>
+          <p:nvPr/>
+        </p:nvPicPr>
+        <p:blipFill>
+          <a:blip r:embed="rId8"/>
+          <a:stretch>
+            <a:fillRect/>
+          </a:stretch>
+        </p:blipFill>
+        <p:spPr>
+          <a:xfrm>
+            <a:off x="804814" y="4799998"/>
+            <a:ext cx="490484" cy="574568"/>
+          </a:xfrm>
+          <a:prstGeom prst="rect">
+            <a:avLst/>
+          </a:prstGeom>
+        </p:spPr>
+      </p:pic>
+    </p:spTree>
+    <p:extLst>
+      <p:ext uri="{BB962C8B-B14F-4D97-AF65-F5344CB8AC3E}">
+        <p14:creationId xmlns:p14="http://schemas.microsoft.com/office/powerpoint/2010/main" val="644742159"/>
+      </p:ext>
+    </p:extLst>
+  </p:cSld>
+  <p:clrMapOvr>
+    <a:masterClrMapping/>
+  </p:clrMapOvr>
+  <p:transition spd="slow">
+    <p:randomBar/>
+  </p:transition>
+  <p:timing>
+    <p:tnLst>
+      <p:par>
+        <p:cTn id="1" dur="indefinite" restart="never" nodeType="tmRoot"/>
+      </p:par>
+    </p:tnLst>
+  </p:timing>
+</p:sld>
+</file>
+
+<file path=ppt/slides/slide8.xml><?xml version="1.0" encoding="utf-8"?>
+<p:sld xmlns:a="http://schemas.openxmlformats.org/drawingml/2006/main" xmlns:r="http://schemas.openxmlformats.org/officeDocument/2006/relationships" xmlns:p="http://schemas.openxmlformats.org/presentationml/2006/main">
+  <p:cSld>
+    <p:spTree>
+      <p:nvGrpSpPr>
+        <p:cNvPr id="1" name=""/>
+        <p:cNvGrpSpPr/>
+        <p:nvPr/>
+      </p:nvGrpSpPr>
+      <p:grpSpPr>
+        <a:xfrm>
+          <a:off x="0" y="0"/>
+          <a:ext cx="0" cy="0"/>
+          <a:chOff x="0" y="0"/>
+          <a:chExt cx="0" cy="0"/>
+        </a:xfrm>
+      </p:grpSpPr>
+      <p:sp>
+        <p:nvSpPr>
+          <p:cNvPr id="2" name="Заголовок 1"/>
+          <p:cNvSpPr>
+            <a:spLocks noGrp="1"/>
+          </p:cNvSpPr>
+          <p:nvPr>
+            <p:ph type="title"/>
+          </p:nvPr>
+        </p:nvSpPr>
+        <p:spPr>
+          <a:xfrm>
+            <a:off x="839788" y="457200"/>
+            <a:ext cx="3932237" cy="1050966"/>
+          </a:xfrm>
+        </p:spPr>
+        <p:txBody>
+          <a:bodyPr>
+            <a:normAutofit/>
+          </a:bodyPr>
+          <a:lstStyle/>
+          <a:p>
+            <a:pPr algn="ctr"/>
+            <a:r>
+              <a:rPr lang="ru-RU" b="1" spc="50" dirty="0">
+                <a:ln w="0"/>
+                <a:solidFill>
+                  <a:srgbClr val="00FFFF"/>
+                </a:solidFill>
+                <a:effectLst>
+                  <a:innerShdw blurRad="63500" dist="50800" dir="13500000">
+                    <a:srgbClr val="000000">
+                      <a:alpha val="50000"/>
+                    </a:srgbClr>
+                  </a:innerShdw>
+                </a:effectLst>
+                <a:latin typeface="Courier New" panose="02070309020205020404" pitchFamily="49" charset="0"/>
+                <a:cs typeface="Courier New" panose="02070309020205020404" pitchFamily="49" charset="0"/>
+              </a:rPr>
+              <a:t>С</a:t>
+            </a:r>
+            <a:r>
+              <a:rPr lang="ru-RU" b="1" spc="50" dirty="0" smtClean="0">
+                <a:ln w="0"/>
+                <a:solidFill>
+                  <a:srgbClr val="00FFFF"/>
+                </a:solidFill>
+                <a:effectLst>
+                  <a:innerShdw blurRad="63500" dist="50800" dir="13500000">
+                    <a:srgbClr val="000000">
+                      <a:alpha val="50000"/>
+                    </a:srgbClr>
+                  </a:innerShdw>
+                </a:effectLst>
+                <a:latin typeface="Courier New" panose="02070309020205020404" pitchFamily="49" charset="0"/>
+                <a:cs typeface="Courier New" panose="02070309020205020404" pitchFamily="49" charset="0"/>
+              </a:rPr>
+              <a:t>истема сохранений</a:t>
+            </a:r>
+            <a:endParaRPr lang="ru-RU" dirty="0">
+              <a:latin typeface="Courier New" panose="02070309020205020404" pitchFamily="49" charset="0"/>
+              <a:cs typeface="Courier New" panose="02070309020205020404" pitchFamily="49" charset="0"/>
+            </a:endParaRPr>
+          </a:p>
+        </p:txBody>
+      </p:sp>
+      <p:pic>
+        <p:nvPicPr>
+          <p:cNvPr id="6" name="Объект 5"/>
+          <p:cNvPicPr>
+            <a:picLocks noGrp="1" noChangeAspect="1"/>
+          </p:cNvPicPr>
+          <p:nvPr>
+            <p:ph idx="1"/>
+          </p:nvPr>
+        </p:nvPicPr>
+        <p:blipFill>
+          <a:blip r:embed="rId2"/>
+          <a:stretch>
+            <a:fillRect/>
+          </a:stretch>
+        </p:blipFill>
+        <p:spPr>
+          <a:xfrm>
+            <a:off x="5396944" y="728524"/>
+            <a:ext cx="6172200" cy="4655156"/>
+          </a:xfrm>
+          <a:prstGeom prst="rect">
+            <a:avLst/>
+          </a:prstGeom>
+        </p:spPr>
+      </p:pic>
+      <p:sp>
+        <p:nvSpPr>
+          <p:cNvPr id="4" name="Текст 3"/>
+          <p:cNvSpPr>
+            <a:spLocks noGrp="1"/>
+          </p:cNvSpPr>
+          <p:nvPr>
+            <p:ph type="body" sz="half" idx="2"/>
+          </p:nvPr>
+        </p:nvSpPr>
+        <p:spPr>
+          <a:xfrm>
+            <a:off x="839787" y="1677389"/>
+            <a:ext cx="3932237" cy="4367152"/>
+          </a:xfrm>
+        </p:spPr>
+        <p:txBody>
+          <a:bodyPr>
+            <a:normAutofit/>
+          </a:bodyPr>
+          <a:lstStyle/>
+          <a:p>
+            <a:r>
+              <a:rPr lang="ru-RU" dirty="0" smtClean="0">
+                <a:solidFill>
+                  <a:srgbClr val="00FFFF"/>
+                </a:solidFill>
+                <a:latin typeface="Courier New" panose="02070309020205020404" pitchFamily="49" charset="0"/>
+                <a:cs typeface="Courier New" panose="02070309020205020404" pitchFamily="49" charset="0"/>
+              </a:rPr>
+              <a:t>Сохранения реализованы достаточно просто, но удобно – в </a:t>
+            </a:r>
+            <a:r>
+              <a:rPr lang="ru-RU" dirty="0" smtClean="0">
+                <a:solidFill>
+                  <a:srgbClr val="00FF00"/>
+                </a:solidFill>
+                <a:latin typeface="Courier New" panose="02070309020205020404" pitchFamily="49" charset="0"/>
+                <a:cs typeface="Courier New" panose="02070309020205020404" pitchFamily="49" charset="0"/>
+              </a:rPr>
+              <a:t>.</a:t>
+            </a:r>
+            <a:r>
+              <a:rPr lang="en-US" dirty="0" smtClean="0">
+                <a:solidFill>
+                  <a:srgbClr val="00FF00"/>
+                </a:solidFill>
+                <a:latin typeface="Courier New" panose="02070309020205020404" pitchFamily="49" charset="0"/>
+                <a:cs typeface="Courier New" panose="02070309020205020404" pitchFamily="49" charset="0"/>
+              </a:rPr>
+              <a:t>txt</a:t>
+            </a:r>
+            <a:r>
+              <a:rPr lang="ru-RU" dirty="0" smtClean="0">
+                <a:solidFill>
+                  <a:srgbClr val="00FF00"/>
+                </a:solidFill>
+                <a:latin typeface="Courier New" panose="02070309020205020404" pitchFamily="49" charset="0"/>
+                <a:cs typeface="Courier New" panose="02070309020205020404" pitchFamily="49" charset="0"/>
+              </a:rPr>
+              <a:t> </a:t>
+            </a:r>
+            <a:r>
+              <a:rPr lang="ru-RU" dirty="0" smtClean="0">
+                <a:solidFill>
+                  <a:srgbClr val="00FFFF"/>
+                </a:solidFill>
+                <a:latin typeface="Courier New" panose="02070309020205020404" pitchFamily="49" charset="0"/>
+                <a:cs typeface="Courier New" panose="02070309020205020404" pitchFamily="49" charset="0"/>
+              </a:rPr>
+              <a:t>файле содержится 12 строк, в каждой из которых через </a:t>
+            </a:r>
+            <a:r>
+              <a:rPr lang="en-US" dirty="0" smtClean="0">
+                <a:solidFill>
+                  <a:srgbClr val="00FFFF"/>
+                </a:solidFill>
+                <a:latin typeface="Courier New" panose="02070309020205020404" pitchFamily="49" charset="0"/>
+                <a:cs typeface="Courier New" panose="02070309020205020404" pitchFamily="49" charset="0"/>
+              </a:rPr>
+              <a:t>“</a:t>
+            </a:r>
+            <a:r>
+              <a:rPr lang="ru-RU" dirty="0">
+                <a:solidFill>
+                  <a:srgbClr val="00FFFF"/>
+                </a:solidFill>
+                <a:latin typeface="Courier New" panose="02070309020205020404" pitchFamily="49" charset="0"/>
+                <a:cs typeface="Courier New" panose="02070309020205020404" pitchFamily="49" charset="0"/>
+              </a:rPr>
+              <a:t>;</a:t>
+            </a:r>
+            <a:r>
+              <a:rPr lang="en-US" dirty="0" smtClean="0">
+                <a:solidFill>
+                  <a:srgbClr val="00FFFF"/>
+                </a:solidFill>
+                <a:latin typeface="Courier New" panose="02070309020205020404" pitchFamily="49" charset="0"/>
+                <a:cs typeface="Courier New" panose="02070309020205020404" pitchFamily="49" charset="0"/>
+              </a:rPr>
+              <a:t>”</a:t>
+            </a:r>
+            <a:r>
+              <a:rPr lang="ru-RU" dirty="0" smtClean="0">
+                <a:solidFill>
+                  <a:srgbClr val="00FFFF"/>
+                </a:solidFill>
+                <a:latin typeface="Courier New" panose="02070309020205020404" pitchFamily="49" charset="0"/>
+                <a:cs typeface="Courier New" panose="02070309020205020404" pitchFamily="49" charset="0"/>
+              </a:rPr>
+              <a:t> записаны результаты прохождений первого и второго уровня. Вращением колеса мыши пользователь двигает указатель (    ) и тем самым выбирает ячейку сохранения, а если в ячейке нет никаких данных или данные некорректны – выводится </a:t>
+            </a:r>
+            <a:r>
+              <a:rPr lang="ru-RU" dirty="0" smtClean="0">
+                <a:solidFill>
+                  <a:srgbClr val="FF0000"/>
+                </a:solidFill>
+                <a:latin typeface="Courier New" panose="02070309020205020404" pitchFamily="49" charset="0"/>
+                <a:cs typeface="Courier New" panose="02070309020205020404" pitchFamily="49" charset="0"/>
+              </a:rPr>
+              <a:t>сообщение об ошибке</a:t>
+            </a:r>
+            <a:r>
+              <a:rPr lang="ru-RU" dirty="0" smtClean="0">
+                <a:solidFill>
+                  <a:srgbClr val="00FFFF"/>
+                </a:solidFill>
+                <a:latin typeface="Courier New" panose="02070309020205020404" pitchFamily="49" charset="0"/>
+                <a:cs typeface="Courier New" panose="02070309020205020404" pitchFamily="49" charset="0"/>
+              </a:rPr>
+              <a:t>. Как и было сказано выше – просто и понятно.</a:t>
+            </a:r>
+            <a:br>
+              <a:rPr lang="ru-RU" dirty="0" smtClean="0">
+                <a:solidFill>
+                  <a:srgbClr val="00FFFF"/>
+                </a:solidFill>
+                <a:latin typeface="Courier New" panose="02070309020205020404" pitchFamily="49" charset="0"/>
+                <a:cs typeface="Courier New" panose="02070309020205020404" pitchFamily="49" charset="0"/>
+              </a:rPr>
+            </a:br>
+            <a:endParaRPr lang="ru-RU" i="1" dirty="0" smtClean="0">
+              <a:solidFill>
+                <a:srgbClr val="00FFFF"/>
+              </a:solidFill>
+              <a:latin typeface="Courier New" panose="02070309020205020404" pitchFamily="49" charset="0"/>
+              <a:cs typeface="Courier New" panose="02070309020205020404" pitchFamily="49" charset="0"/>
+            </a:endParaRPr>
+          </a:p>
+        </p:txBody>
+      </p:sp>
+      <p:sp>
+        <p:nvSpPr>
+          <p:cNvPr id="7" name="TextBox 6"/>
+          <p:cNvSpPr txBox="1"/>
+          <p:nvPr/>
+        </p:nvSpPr>
+        <p:spPr>
+          <a:xfrm>
+            <a:off x="720437" y="5582876"/>
+            <a:ext cx="10848707" cy="923330"/>
+          </a:xfrm>
+          <a:prstGeom prst="rect">
+            <a:avLst/>
+          </a:prstGeom>
+          <a:noFill/>
+        </p:spPr>
+        <p:txBody>
+          <a:bodyPr wrap="square" rtlCol="0">
+            <a:spAutoFit/>
+          </a:bodyPr>
+          <a:lstStyle/>
+          <a:p>
+            <a:r>
+              <a:rPr lang="ru-RU" i="1" dirty="0">
+                <a:solidFill>
+                  <a:srgbClr val="00FFFF"/>
+                </a:solidFill>
+                <a:latin typeface="Courier New" panose="02070309020205020404" pitchFamily="49" charset="0"/>
+                <a:cs typeface="Courier New" panose="02070309020205020404" pitchFamily="49" charset="0"/>
+              </a:rPr>
+              <a:t>Занимательный факт: </a:t>
+            </a:r>
+            <a:r>
+              <a:rPr lang="ru-RU" dirty="0">
+                <a:solidFill>
+                  <a:srgbClr val="00FFFF"/>
+                </a:solidFill>
+                <a:latin typeface="Courier New" panose="02070309020205020404" pitchFamily="49" charset="0"/>
+                <a:cs typeface="Courier New" panose="02070309020205020404" pitchFamily="49" charset="0"/>
+              </a:rPr>
+              <a:t>изначально планировалось использование </a:t>
+            </a:r>
+            <a:r>
+              <a:rPr lang="en-US" dirty="0">
+                <a:solidFill>
+                  <a:srgbClr val="00FF00"/>
+                </a:solidFill>
+                <a:latin typeface="Courier New" panose="02070309020205020404" pitchFamily="49" charset="0"/>
+                <a:cs typeface="Courier New" panose="02070309020205020404" pitchFamily="49" charset="0"/>
+              </a:rPr>
+              <a:t>csv</a:t>
+            </a:r>
+            <a:r>
+              <a:rPr lang="ru-RU" dirty="0">
+                <a:solidFill>
+                  <a:srgbClr val="00FFFF"/>
+                </a:solidFill>
+                <a:latin typeface="Courier New" panose="02070309020205020404" pitchFamily="49" charset="0"/>
+                <a:cs typeface="Courier New" panose="02070309020205020404" pitchFamily="49" charset="0"/>
+              </a:rPr>
+              <a:t> таблицы, но, как оказалось, реализовать изменение ячейки в ней сложнее.</a:t>
+            </a:r>
+            <a:endParaRPr lang="ru-RU" i="1" dirty="0">
+              <a:solidFill>
+                <a:srgbClr val="00FFFF"/>
+              </a:solidFill>
+              <a:latin typeface="Courier New" panose="02070309020205020404" pitchFamily="49" charset="0"/>
+              <a:cs typeface="Courier New" panose="02070309020205020404" pitchFamily="49" charset="0"/>
+            </a:endParaRPr>
+          </a:p>
+          <a:p>
+            <a:endParaRPr lang="ru-RU" dirty="0"/>
+          </a:p>
+        </p:txBody>
+      </p:sp>
+    </p:spTree>
+    <p:extLst>
+      <p:ext uri="{BB962C8B-B14F-4D97-AF65-F5344CB8AC3E}">
+        <p14:creationId xmlns:p14="http://schemas.microsoft.com/office/powerpoint/2010/main" val="141759877"/>
+      </p:ext>
+    </p:extLst>
+  </p:cSld>
+  <p:clrMapOvr>
+    <a:masterClrMapping/>
+  </p:clrMapOvr>
+  <p:transition spd="slow">
+    <p:randomBar/>
+  </p:transition>
+  <p:timing>
+    <p:tnLst>
+      <p:par>
+        <p:cTn id="1" dur="indefinite" restart="never" nodeType="tmRoot">
+          <p:childTnLst>
+            <p:seq concurrent="1" nextAc="seek">
+              <p:cTn id="2" dur="indefinite" nodeType="mainSeq">
+                <p:childTnLst>
+                  <p:par>
+                    <p:cTn id="3" fill="hold">
+                      <p:stCondLst>
+                        <p:cond delay="indefinite"/>
+                      </p:stCondLst>
+                      <p:childTnLst>
+                        <p:par>
+                          <p:cTn id="4" fill="hold">
+                            <p:stCondLst>
+                              <p:cond delay="0"/>
+                            </p:stCondLst>
+                            <p:childTnLst>
+                              <p:par>
+                                <p:cTn id="5" presetID="14" presetClass="entr" presetSubtype="10" fill="hold" nodeType="clickEffect">
+                                  <p:stCondLst>
+                                    <p:cond delay="0"/>
+                                  </p:stCondLst>
+                                  <p:childTnLst>
+                                    <p:set>
+                                      <p:cBhvr>
+                                        <p:cTn id="6" dur="1" fill="hold">
+                                          <p:stCondLst>
+                                            <p:cond delay="0"/>
+                                          </p:stCondLst>
+                                        </p:cTn>
+                                        <p:tgtEl>
+                                          <p:spTgt spid="7">
+                                            <p:txEl>
+                                              <p:pRg st="0" end="0"/>
+                                            </p:txEl>
+                                          </p:spTgt>
+                                        </p:tgtEl>
+                                        <p:attrNameLst>
+                                          <p:attrName>style.visibility</p:attrName>
+                                        </p:attrNameLst>
+                                      </p:cBhvr>
+                                      <p:to>
+                                        <p:strVal val="visible"/>
+                                      </p:to>
+                                    </p:set>
+                                    <p:animEffect transition="in" filter="randombar(horizontal)">
+                                      <p:cBhvr>
+                                        <p:cTn id="7" dur="500"/>
+                                        <p:tgtEl>
+                                          <p:spTgt spid="7">
+                                            <p:txEl>
+                                              <p:pRg st="0" end="0"/>
+                                            </p:txEl>
+                                          </p:spTgt>
+                                        </p:tgtEl>
+                                      </p:cBhvr>
+                                    </p:animEffect>
+                                  </p:childTnLst>
+                                </p:cTn>
+                              </p:par>
+                            </p:childTnLst>
+                          </p:cTn>
+                        </p:par>
+                      </p:childTnLst>
+                    </p:cTn>
+                  </p:par>
+                </p:childTnLst>
+              </p:cTn>
+              <p:prevCondLst>
+                <p:cond evt="onPrev" delay="0">
+                  <p:tgtEl>
+                    <p:sldTgt/>
+                  </p:tgtEl>
+                </p:cond>
+              </p:prevCondLst>
+              <p:nextCondLst>
+                <p:cond evt="onNext" delay="0">
+                  <p:tgtEl>
+                    <p:sldTgt/>
+                  </p:tgtEl>
+                </p:cond>
+              </p:nextCondLst>
+            </p:seq>
+          </p:childTnLst>
+        </p:cTn>
+      </p:par>
+    </p:tnLst>
+  </p:timing>
+</p:sld>
+</file>
+
+<file path=ppt/slides/slide9.xml><?xml version="1.0" encoding="utf-8"?>
+<p:sld xmlns:a="http://schemas.openxmlformats.org/drawingml/2006/main" xmlns:r="http://schemas.openxmlformats.org/officeDocument/2006/relationships" xmlns:p="http://schemas.openxmlformats.org/presentationml/2006/main">
+  <p:cSld>
+    <p:spTree>
+      <p:nvGrpSpPr>
+        <p:cNvPr id="1" name=""/>
+        <p:cNvGrpSpPr/>
+        <p:nvPr/>
+      </p:nvGrpSpPr>
+      <p:grpSpPr>
+        <a:xfrm>
+          <a:off x="0" y="0"/>
+          <a:ext cx="0" cy="0"/>
+          <a:chOff x="0" y="0"/>
+          <a:chExt cx="0" cy="0"/>
+        </a:xfrm>
+      </p:grpSpPr>
+      <p:sp>
+        <p:nvSpPr>
+          <p:cNvPr id="2" name="Заголовок 1"/>
+          <p:cNvSpPr>
+            <a:spLocks noGrp="1"/>
+          </p:cNvSpPr>
+          <p:nvPr>
+            <p:ph type="title"/>
+          </p:nvPr>
+        </p:nvSpPr>
+        <p:spPr/>
+        <p:txBody>
+          <a:bodyPr/>
+          <a:lstStyle/>
+          <a:p>
+            <a:endParaRPr lang="ru-RU" dirty="0"/>
+          </a:p>
+        </p:txBody>
+      </p:sp>
+      <p:sp>
+        <p:nvSpPr>
+          <p:cNvPr id="3" name="Объект 2"/>
+          <p:cNvSpPr>
+            <a:spLocks noGrp="1"/>
+          </p:cNvSpPr>
+          <p:nvPr>
+            <p:ph idx="1"/>
+          </p:nvPr>
+        </p:nvSpPr>
+        <p:spPr/>
+        <p:txBody>
+          <a:bodyPr/>
+          <a:lstStyle/>
+          <a:p>
+            <a:pPr marL="0" indent="0">
+              <a:buNone/>
+            </a:pPr>
+            <a:r>
+              <a:rPr lang="ru-RU" dirty="0" smtClean="0">
+                <a:solidFill>
+                  <a:schemeClr val="bg1"/>
+                </a:solidFill>
+              </a:rPr>
+              <a:t>СЛАЙД ДЛЯ БОССА</a:t>
+            </a:r>
+            <a:endParaRPr lang="ru-RU" dirty="0">
+              <a:solidFill>
+                <a:schemeClr val="bg1"/>
+              </a:solidFill>
+            </a:endParaRPr>
+          </a:p>
+        </p:txBody>
+      </p:sp>
+      <p:sp>
+        <p:nvSpPr>
+          <p:cNvPr id="4" name="Текст 3"/>
+          <p:cNvSpPr>
+            <a:spLocks noGrp="1"/>
+          </p:cNvSpPr>
+          <p:nvPr>
+            <p:ph type="body" sz="half" idx="2"/>
+          </p:nvPr>
+        </p:nvSpPr>
+        <p:spPr/>
+        <p:txBody>
+          <a:bodyPr/>
+          <a:lstStyle/>
+          <a:p>
+            <a:endParaRPr lang="ru-RU" dirty="0"/>
+          </a:p>
+        </p:txBody>
+      </p:sp>
+    </p:spTree>
+    <p:extLst>
+      <p:ext uri="{BB962C8B-B14F-4D97-AF65-F5344CB8AC3E}">
+        <p14:creationId xmlns:p14="http://schemas.microsoft.com/office/powerpoint/2010/main" val="3788135675"/>
+      </p:ext>
+    </p:extLst>
+  </p:cSld>
+  <p:clrMapOvr>
+    <a:masterClrMapping/>
+  </p:clrMapOvr>
+  <p:transition spd="slow">
+    <p:randomBar/>
+  </p:transition>
+  <p:timing>
+    <p:tnLst>
+      <p:par>
+        <p:cTn id="1" dur="indefinite" restart="never" nodeType="tmRoot"/>
+      </p:par>
+    </p:tnLst>
+  </p:timing>
 </p:sld>
 </file>
 

</xml_diff>